<commit_message>
Added AUTOSAR Builder to the "Tools" page list.
</commit_message>
<xml_diff>
--- a/static/media/tools/eFMI-tools.pptx
+++ b/static/media/tools/eFMI-tools.pptx
@@ -11,16 +11,16 @@
   <p:notesSz cx="6858000" cy="9144000"/>
   <p:embeddedFontLst>
     <p:embeddedFont>
-      <p:font typeface="Calibri" panose="020F0502020204030204" pitchFamily="34" charset="0"/>
+      <p:font typeface="Calibri Light" panose="020F0302020204030204" pitchFamily="34" charset="0"/>
       <p:regular r:id="rId3"/>
-      <p:bold r:id="rId4"/>
-      <p:italic r:id="rId5"/>
-      <p:boldItalic r:id="rId6"/>
+      <p:italic r:id="rId4"/>
     </p:embeddedFont>
     <p:embeddedFont>
-      <p:font typeface="Calibri Light" panose="020F0302020204030204" pitchFamily="34" charset="0"/>
-      <p:regular r:id="rId7"/>
-      <p:italic r:id="rId8"/>
+      <p:font typeface="Calibri" panose="020F0502020204030204" pitchFamily="34" charset="0"/>
+      <p:regular r:id="rId5"/>
+      <p:bold r:id="rId6"/>
+      <p:italic r:id="rId7"/>
+      <p:boldItalic r:id="rId8"/>
     </p:embeddedFont>
   </p:embeddedFontLst>
   <p:defaultTextStyle>
@@ -118,6 +118,11 @@
       </a:defRPr>
     </a:lvl9pPr>
   </p:defaultTextStyle>
+  <p:extLst>
+    <p:ext uri="{EFAFB233-063F-42B5-8137-9DF3F51BA10A}">
+      <p15:sldGuideLst xmlns:p15="http://schemas.microsoft.com/office/powerpoint/2012/main"/>
+    </p:ext>
+  </p:extLst>
 </p:presentation>
 </file>
 
@@ -252,7 +257,7 @@
           <a:p>
             <a:fld id="{076171DA-D5DD-486B-A5F5-158E752AA603}" type="datetimeFigureOut">
               <a:rPr lang="en-US" smtClean="0"/>
-              <a:t>4/17/2023</a:t>
+              <a:t>4/18/2023</a:t>
             </a:fld>
             <a:endParaRPr lang="en-US"/>
           </a:p>
@@ -422,7 +427,7 @@
           <a:p>
             <a:fld id="{076171DA-D5DD-486B-A5F5-158E752AA603}" type="datetimeFigureOut">
               <a:rPr lang="en-US" smtClean="0"/>
-              <a:t>4/17/2023</a:t>
+              <a:t>4/18/2023</a:t>
             </a:fld>
             <a:endParaRPr lang="en-US"/>
           </a:p>
@@ -602,7 +607,7 @@
           <a:p>
             <a:fld id="{076171DA-D5DD-486B-A5F5-158E752AA603}" type="datetimeFigureOut">
               <a:rPr lang="en-US" smtClean="0"/>
-              <a:t>4/17/2023</a:t>
+              <a:t>4/18/2023</a:t>
             </a:fld>
             <a:endParaRPr lang="en-US"/>
           </a:p>
@@ -772,7 +777,7 @@
           <a:p>
             <a:fld id="{076171DA-D5DD-486B-A5F5-158E752AA603}" type="datetimeFigureOut">
               <a:rPr lang="en-US" smtClean="0"/>
-              <a:t>4/17/2023</a:t>
+              <a:t>4/18/2023</a:t>
             </a:fld>
             <a:endParaRPr lang="en-US"/>
           </a:p>
@@ -1018,7 +1023,7 @@
           <a:p>
             <a:fld id="{076171DA-D5DD-486B-A5F5-158E752AA603}" type="datetimeFigureOut">
               <a:rPr lang="en-US" smtClean="0"/>
-              <a:t>4/17/2023</a:t>
+              <a:t>4/18/2023</a:t>
             </a:fld>
             <a:endParaRPr lang="en-US"/>
           </a:p>
@@ -1250,7 +1255,7 @@
           <a:p>
             <a:fld id="{076171DA-D5DD-486B-A5F5-158E752AA603}" type="datetimeFigureOut">
               <a:rPr lang="en-US" smtClean="0"/>
-              <a:t>4/17/2023</a:t>
+              <a:t>4/18/2023</a:t>
             </a:fld>
             <a:endParaRPr lang="en-US"/>
           </a:p>
@@ -1617,7 +1622,7 @@
           <a:p>
             <a:fld id="{076171DA-D5DD-486B-A5F5-158E752AA603}" type="datetimeFigureOut">
               <a:rPr lang="en-US" smtClean="0"/>
-              <a:t>4/17/2023</a:t>
+              <a:t>4/18/2023</a:t>
             </a:fld>
             <a:endParaRPr lang="en-US"/>
           </a:p>
@@ -1735,7 +1740,7 @@
           <a:p>
             <a:fld id="{076171DA-D5DD-486B-A5F5-158E752AA603}" type="datetimeFigureOut">
               <a:rPr lang="en-US" smtClean="0"/>
-              <a:t>4/17/2023</a:t>
+              <a:t>4/18/2023</a:t>
             </a:fld>
             <a:endParaRPr lang="en-US"/>
           </a:p>
@@ -1830,7 +1835,7 @@
           <a:p>
             <a:fld id="{076171DA-D5DD-486B-A5F5-158E752AA603}" type="datetimeFigureOut">
               <a:rPr lang="en-US" smtClean="0"/>
-              <a:t>4/17/2023</a:t>
+              <a:t>4/18/2023</a:t>
             </a:fld>
             <a:endParaRPr lang="en-US"/>
           </a:p>
@@ -2107,7 +2112,7 @@
           <a:p>
             <a:fld id="{076171DA-D5DD-486B-A5F5-158E752AA603}" type="datetimeFigureOut">
               <a:rPr lang="en-US" smtClean="0"/>
-              <a:t>4/17/2023</a:t>
+              <a:t>4/18/2023</a:t>
             </a:fld>
             <a:endParaRPr lang="en-US"/>
           </a:p>
@@ -2360,7 +2365,7 @@
           <a:p>
             <a:fld id="{076171DA-D5DD-486B-A5F5-158E752AA603}" type="datetimeFigureOut">
               <a:rPr lang="en-US" smtClean="0"/>
-              <a:t>4/17/2023</a:t>
+              <a:t>4/18/2023</a:t>
             </a:fld>
             <a:endParaRPr lang="en-US"/>
           </a:p>
@@ -2573,7 +2578,7 @@
           <a:p>
             <a:fld id="{076171DA-D5DD-486B-A5F5-158E752AA603}" type="datetimeFigureOut">
               <a:rPr lang="en-US" smtClean="0"/>
-              <a:t>4/17/2023</a:t>
+              <a:t>4/18/2023</a:t>
             </a:fld>
             <a:endParaRPr lang="en-US"/>
           </a:p>
@@ -3105,7 +3110,7 @@
             <p:nvPr/>
           </p:nvPicPr>
           <p:blipFill>
-            <a:blip r:embed="rId4" cstate="print">
+            <a:blip r:embed="rId5" cstate="print">
               <a:extLst>
                 <a:ext uri="{28A0092B-C50C-407E-A947-70E740481C1C}">
                   <a14:useLocalDpi xmlns:a14="http://schemas.microsoft.com/office/drawing/2010/main" val="0"/>
@@ -3205,7 +3210,7 @@
             <p:nvPr/>
           </p:nvPicPr>
           <p:blipFill>
-            <a:blip r:embed="rId5">
+            <a:blip r:embed="rId6">
               <a:extLst>
                 <a:ext uri="{28A0092B-C50C-407E-A947-70E740481C1C}">
                   <a14:useLocalDpi xmlns:a14="http://schemas.microsoft.com/office/drawing/2010/main" val="0"/>
@@ -3325,18 +3330,17 @@
             <p:cNvPr id="11" name="Gewinkelte Verbindung 26"/>
             <p:cNvCxnSpPr>
               <a:stCxn id="76" idx="3"/>
-              <a:endCxn id="54" idx="4"/>
             </p:cNvCxnSpPr>
             <p:nvPr/>
           </p:nvCxnSpPr>
           <p:spPr>
             <a:xfrm flipH="1">
-              <a:off x="5964595" y="2571853"/>
-              <a:ext cx="1514858" cy="1524775"/>
+              <a:off x="5970077" y="2571853"/>
+              <a:ext cx="1509376" cy="1377886"/>
             </a:xfrm>
             <a:prstGeom prst="bentConnector3">
               <a:avLst>
-                <a:gd name="adj1" fmla="val -41309"/>
+                <a:gd name="adj1" fmla="val -44729"/>
               </a:avLst>
             </a:prstGeom>
             <a:noFill/>
@@ -3358,12 +3362,12 @@
             </p:cNvPicPr>
             <p:nvPr>
               <p:custDataLst>
-                <p:tags r:id="rId1"/>
+                <p:tags r:id="rId2"/>
               </p:custDataLst>
             </p:nvPr>
           </p:nvPicPr>
           <p:blipFill rotWithShape="1">
-            <a:blip r:embed="rId6" cstate="print">
+            <a:blip r:embed="rId7" cstate="print">
               <a:extLst>
                 <a:ext uri="{28A0092B-C50C-407E-A947-70E740481C1C}">
                   <a14:useLocalDpi xmlns:a14="http://schemas.microsoft.com/office/drawing/2010/main" val="0"/>
@@ -3516,18 +3520,17 @@
             <p:cNvPr id="41" name="Gewinkelte Verbindung 26"/>
             <p:cNvCxnSpPr>
               <a:stCxn id="2" idx="3"/>
-              <a:endCxn id="54" idx="4"/>
             </p:cNvCxnSpPr>
             <p:nvPr/>
           </p:nvCxnSpPr>
           <p:spPr>
             <a:xfrm flipH="1">
-              <a:off x="5964595" y="3566116"/>
-              <a:ext cx="1918074" cy="530512"/>
+              <a:off x="5970078" y="3566117"/>
+              <a:ext cx="1912591" cy="386407"/>
             </a:xfrm>
             <a:prstGeom prst="bentConnector3">
               <a:avLst>
-                <a:gd name="adj1" fmla="val -11918"/>
+                <a:gd name="adj1" fmla="val -14359"/>
               </a:avLst>
             </a:prstGeom>
             <a:noFill/>
@@ -3549,8 +3552,8 @@
           </p:nvSpPr>
           <p:spPr>
             <a:xfrm>
-              <a:off x="9436996" y="2832132"/>
-              <a:ext cx="1376123" cy="692497"/>
+              <a:off x="9436996" y="2998572"/>
+              <a:ext cx="1376123" cy="692498"/>
             </a:xfrm>
             <a:prstGeom prst="rect">
               <a:avLst/>
@@ -4293,7 +4296,7 @@
             <p:nvPr/>
           </p:nvPicPr>
           <p:blipFill>
-            <a:blip r:embed="rId7" cstate="print">
+            <a:blip r:embed="rId8" cstate="print">
               <a:extLst>
                 <a:ext uri="{28A0092B-C50C-407E-A947-70E740481C1C}">
                   <a14:useLocalDpi xmlns:a14="http://schemas.microsoft.com/office/drawing/2010/main" val="0"/>
@@ -4323,7 +4326,7 @@
             <p:nvPr/>
           </p:nvPicPr>
           <p:blipFill>
-            <a:blip r:embed="rId8" cstate="print">
+            <a:blip r:embed="rId9" cstate="print">
               <a:extLst>
                 <a:ext uri="{28A0092B-C50C-407E-A947-70E740481C1C}">
                   <a14:useLocalDpi xmlns:a14="http://schemas.microsoft.com/office/drawing/2010/main" val="0"/>
@@ -4350,7 +4353,7 @@
             <p:cNvSpPr txBox="1"/>
             <p:nvPr>
               <p:custDataLst>
-                <p:tags r:id="rId2"/>
+                <p:tags r:id="rId3"/>
               </p:custDataLst>
             </p:nvPr>
           </p:nvSpPr>
@@ -4414,7 +4417,7 @@
             <p:nvPr/>
           </p:nvPicPr>
           <p:blipFill>
-            <a:blip r:embed="rId9">
+            <a:blip r:embed="rId10">
               <a:extLst>
                 <a:ext uri="{28A0092B-C50C-407E-A947-70E740481C1C}">
                   <a14:useLocalDpi xmlns:a14="http://schemas.microsoft.com/office/drawing/2010/main" val="0"/>
@@ -4494,7 +4497,7 @@
             <p:nvPr/>
           </p:nvPicPr>
           <p:blipFill>
-            <a:blip r:embed="rId10">
+            <a:blip r:embed="rId11">
               <a:extLst>
                 <a:ext uri="{28A0092B-C50C-407E-A947-70E740481C1C}">
                   <a14:useLocalDpi xmlns:a14="http://schemas.microsoft.com/office/drawing/2010/main" val="0"/>
@@ -4599,19 +4602,18 @@
           <p:nvCxnSpPr>
             <p:cNvPr id="75" name="Gewinkelte Verbindung 26"/>
             <p:cNvCxnSpPr>
-              <a:endCxn id="53" idx="4"/>
+              <a:endCxn id="3" idx="1"/>
             </p:cNvCxnSpPr>
             <p:nvPr/>
           </p:nvCxnSpPr>
           <p:spPr>
-            <a:xfrm rot="16200000" flipH="1">
-              <a:off x="5683145" y="4586787"/>
-              <a:ext cx="547049" cy="17339"/>
+            <a:xfrm>
+              <a:off x="5961517" y="4235461"/>
+              <a:ext cx="929904" cy="108363"/>
             </a:xfrm>
-            <a:prstGeom prst="bentConnector4">
+            <a:prstGeom prst="bentConnector3">
               <a:avLst>
-                <a:gd name="adj1" fmla="val 2287"/>
-                <a:gd name="adj2" fmla="val 1604856"/>
+                <a:gd name="adj1" fmla="val 50000"/>
               </a:avLst>
             </a:prstGeom>
             <a:noFill/>
@@ -4647,6 +4649,7 @@
                 <a:srgbClr val="00B050"/>
               </a:solidFill>
               <a:prstDash val="sysDot"/>
+              <a:headEnd type="triangle"/>
               <a:tailEnd type="triangle"/>
             </a:ln>
           </p:spPr>
@@ -4674,7 +4677,7 @@
             <p:nvPr/>
           </p:nvPicPr>
           <p:blipFill>
-            <a:blip r:embed="rId11" cstate="print">
+            <a:blip r:embed="rId12" cstate="print">
               <a:extLst>
                 <a:ext uri="{28A0092B-C50C-407E-A947-70E740481C1C}">
                   <a14:useLocalDpi xmlns:a14="http://schemas.microsoft.com/office/drawing/2010/main" val="0"/>
@@ -4696,6 +4699,174 @@
           </p:spPr>
         </p:pic>
       </p:grpSp>
+      <p:pic>
+        <p:nvPicPr>
+          <p:cNvPr id="3" name="Picture 2"/>
+          <p:cNvPicPr>
+            <a:picLocks noChangeAspect="1"/>
+          </p:cNvPicPr>
+          <p:nvPr/>
+        </p:nvPicPr>
+        <p:blipFill>
+          <a:blip r:embed="rId13" cstate="print">
+            <a:extLst>
+              <a:ext uri="{28A0092B-C50C-407E-A947-70E740481C1C}">
+                <a14:useLocalDpi xmlns:a14="http://schemas.microsoft.com/office/drawing/2010/main" val="0"/>
+              </a:ext>
+            </a:extLst>
+          </a:blip>
+          <a:stretch>
+            <a:fillRect/>
+          </a:stretch>
+        </p:blipFill>
+        <p:spPr>
+          <a:xfrm>
+            <a:off x="6959407" y="4083388"/>
+            <a:ext cx="427854" cy="427854"/>
+          </a:xfrm>
+          <a:prstGeom prst="rect">
+            <a:avLst/>
+          </a:prstGeom>
+        </p:spPr>
+      </p:pic>
+      <p:sp>
+        <p:nvSpPr>
+          <p:cNvPr id="42" name="TextBox 41"/>
+          <p:cNvSpPr txBox="1"/>
+          <p:nvPr>
+            <p:custDataLst>
+              <p:tags r:id="rId1"/>
+            </p:custDataLst>
+          </p:nvPr>
+        </p:nvSpPr>
+        <p:spPr>
+          <a:xfrm>
+            <a:off x="6454753" y="4550649"/>
+            <a:ext cx="1442896" cy="200055"/>
+          </a:xfrm>
+          <a:prstGeom prst="rect">
+            <a:avLst/>
+          </a:prstGeom>
+          <a:solidFill>
+            <a:scrgbClr r="0" g="0" b="0">
+              <a:alpha val="0"/>
+            </a:scrgbClr>
+          </a:solidFill>
+          <a:ln>
+            <a:noFill/>
+          </a:ln>
+        </p:spPr>
+        <p:txBody>
+          <a:bodyPr wrap="none" lIns="0" tIns="0" rIns="0" bIns="0" rtlCol="0">
+            <a:spAutoFit/>
+          </a:bodyPr>
+          <a:lstStyle/>
+          <a:p>
+            <a:pPr algn="ctr" eaLnBrk="0" fontAlgn="base" hangingPunct="0">
+              <a:spcBef>
+                <a:spcPts val="500"/>
+              </a:spcBef>
+              <a:spcAft>
+                <a:spcPct val="0"/>
+              </a:spcAft>
+            </a:pPr>
+            <a:r>
+              <a:rPr lang="sv-SE" sz="1300" b="1" dirty="0" smtClean="0">
+                <a:solidFill>
+                  <a:srgbClr val="5E676E"/>
+                </a:solidFill>
+                <a:latin typeface="Arial" panose="020B0604020202020204" pitchFamily="34" charset="0"/>
+                <a:cs typeface="Arial" panose="020B0604020202020204" pitchFamily="34" charset="0"/>
+              </a:rPr>
+              <a:t>AUTOSAR </a:t>
+            </a:r>
+            <a:r>
+              <a:rPr lang="sv-SE" sz="1300" b="1" dirty="0" err="1" smtClean="0">
+                <a:solidFill>
+                  <a:srgbClr val="5E676E"/>
+                </a:solidFill>
+                <a:latin typeface="Arial" panose="020B0604020202020204" pitchFamily="34" charset="0"/>
+                <a:cs typeface="Arial" panose="020B0604020202020204" pitchFamily="34" charset="0"/>
+              </a:rPr>
+              <a:t>Builder</a:t>
+            </a:r>
+            <a:endParaRPr sz="1300" b="1" dirty="0">
+              <a:solidFill>
+                <a:srgbClr val="5E676E"/>
+              </a:solidFill>
+              <a:latin typeface="Arial" panose="020B0604020202020204" pitchFamily="34" charset="0"/>
+              <a:cs typeface="Arial" panose="020B0604020202020204" pitchFamily="34" charset="0"/>
+            </a:endParaRPr>
+          </a:p>
+        </p:txBody>
+      </p:sp>
+      <p:cxnSp>
+        <p:nvCxnSpPr>
+          <p:cNvPr id="43" name="Gewinkelte Verbindung 26"/>
+          <p:cNvCxnSpPr>
+            <a:stCxn id="3" idx="3"/>
+          </p:cNvCxnSpPr>
+          <p:nvPr/>
+        </p:nvCxnSpPr>
+        <p:spPr>
+          <a:xfrm flipH="1">
+            <a:off x="6150165" y="4297315"/>
+            <a:ext cx="1237096" cy="564009"/>
+          </a:xfrm>
+          <a:prstGeom prst="bentConnector3">
+            <a:avLst>
+              <a:gd name="adj1" fmla="val -50584"/>
+            </a:avLst>
+          </a:prstGeom>
+          <a:noFill/>
+          <a:ln w="25400" cap="flat" cmpd="sng" algn="ctr">
+            <a:solidFill>
+              <a:srgbClr val="0070C0"/>
+            </a:solidFill>
+            <a:prstDash val="solid"/>
+            <a:tailEnd type="arrow"/>
+          </a:ln>
+          <a:effectLst/>
+        </p:spPr>
+      </p:cxnSp>
+      <p:cxnSp>
+        <p:nvCxnSpPr>
+          <p:cNvPr id="61" name="Straight Arrow Connector 60"/>
+          <p:cNvCxnSpPr/>
+          <p:nvPr/>
+        </p:nvCxnSpPr>
+        <p:spPr>
+          <a:xfrm>
+            <a:off x="7387261" y="4423195"/>
+            <a:ext cx="1204863" cy="7797"/>
+          </a:xfrm>
+          <a:prstGeom prst="straightConnector1">
+            <a:avLst/>
+          </a:prstGeom>
+          <a:ln w="31750">
+            <a:solidFill>
+              <a:srgbClr val="00B050"/>
+            </a:solidFill>
+            <a:prstDash val="sysDot"/>
+            <a:headEnd type="triangle"/>
+            <a:tailEnd type="triangle"/>
+          </a:ln>
+        </p:spPr>
+        <p:style>
+          <a:lnRef idx="1">
+            <a:schemeClr val="accent1"/>
+          </a:lnRef>
+          <a:fillRef idx="0">
+            <a:schemeClr val="accent1"/>
+          </a:fillRef>
+          <a:effectRef idx="0">
+            <a:schemeClr val="accent1"/>
+          </a:effectRef>
+          <a:fontRef idx="minor">
+            <a:schemeClr val="tx1"/>
+          </a:fontRef>
+        </p:style>
+      </p:cxnSp>
     </p:spTree>
     <p:extLst>
       <p:ext uri="{BB962C8B-B14F-4D97-AF65-F5344CB8AC3E}">
@@ -4706,11 +4877,11 @@
   <p:clrMapOvr>
     <a:masterClrMapping/>
   </p:clrMapOvr>
-  <mc:AlternateContent xmlns:mc="http://schemas.openxmlformats.org/markup-compatibility/2006">
-    <mc:Choice xmlns:p14="http://schemas.microsoft.com/office/powerpoint/2010/main" Requires="p14">
+  <mc:AlternateContent xmlns:mc="http://schemas.openxmlformats.org/markup-compatibility/2006" xmlns:p14="http://schemas.microsoft.com/office/powerpoint/2010/main">
+    <mc:Choice Requires="p14">
       <p:transition spd="slow" p14:dur="2000"/>
     </mc:Choice>
-    <mc:Fallback>
+    <mc:Fallback xmlns="">
       <p:transition spd="slow"/>
     </mc:Fallback>
   </mc:AlternateContent>
@@ -4732,6 +4903,13 @@
 </file>
 
 <file path=ppt/tags/tag2.xml><?xml version="1.0" encoding="utf-8"?>
+<p:tagLst xmlns:a="http://schemas.openxmlformats.org/drawingml/2006/main" xmlns:r="http://schemas.openxmlformats.org/officeDocument/2006/relationships" xmlns:p="http://schemas.openxmlformats.org/presentationml/2006/main">
+  <p:tag name="COLORSETCLASSNAME" val="ColorSet2"/>
+  <p:tag name="COLORS" val="-2;-2;-2;-2;-1;-2"/>
+</p:tagLst>
+</file>
+
+<file path=ppt/tags/tag3.xml><?xml version="1.0" encoding="utf-8"?>
 <p:tagLst xmlns:a="http://schemas.openxmlformats.org/drawingml/2006/main" xmlns:r="http://schemas.openxmlformats.org/officeDocument/2006/relationships" xmlns:p="http://schemas.openxmlformats.org/presentationml/2006/main">
   <p:tag name="COLORSETCLASSNAME" val="ColorSet2"/>
   <p:tag name="COLORS" val="-2;-2;-2;-2;-1;-2"/>

</xml_diff>

<commit_message>
Updated name of former CATIA ESP to Software Production Engineering.
</commit_message>
<xml_diff>
--- a/static/media/tools/eFMI-tools.pptx
+++ b/static/media/tools/eFMI-tools.pptx
@@ -257,7 +257,7 @@
           <a:p>
             <a:fld id="{076171DA-D5DD-486B-A5F5-158E752AA603}" type="datetimeFigureOut">
               <a:rPr lang="en-US" smtClean="0"/>
-              <a:t>8/1/2023</a:t>
+              <a:t>1/9/2024</a:t>
             </a:fld>
             <a:endParaRPr lang="en-US"/>
           </a:p>
@@ -427,7 +427,7 @@
           <a:p>
             <a:fld id="{076171DA-D5DD-486B-A5F5-158E752AA603}" type="datetimeFigureOut">
               <a:rPr lang="en-US" smtClean="0"/>
-              <a:t>8/1/2023</a:t>
+              <a:t>1/9/2024</a:t>
             </a:fld>
             <a:endParaRPr lang="en-US"/>
           </a:p>
@@ -607,7 +607,7 @@
           <a:p>
             <a:fld id="{076171DA-D5DD-486B-A5F5-158E752AA603}" type="datetimeFigureOut">
               <a:rPr lang="en-US" smtClean="0"/>
-              <a:t>8/1/2023</a:t>
+              <a:t>1/9/2024</a:t>
             </a:fld>
             <a:endParaRPr lang="en-US"/>
           </a:p>
@@ -777,7 +777,7 @@
           <a:p>
             <a:fld id="{076171DA-D5DD-486B-A5F5-158E752AA603}" type="datetimeFigureOut">
               <a:rPr lang="en-US" smtClean="0"/>
-              <a:t>8/1/2023</a:t>
+              <a:t>1/9/2024</a:t>
             </a:fld>
             <a:endParaRPr lang="en-US"/>
           </a:p>
@@ -1023,7 +1023,7 @@
           <a:p>
             <a:fld id="{076171DA-D5DD-486B-A5F5-158E752AA603}" type="datetimeFigureOut">
               <a:rPr lang="en-US" smtClean="0"/>
-              <a:t>8/1/2023</a:t>
+              <a:t>1/9/2024</a:t>
             </a:fld>
             <a:endParaRPr lang="en-US"/>
           </a:p>
@@ -1255,7 +1255,7 @@
           <a:p>
             <a:fld id="{076171DA-D5DD-486B-A5F5-158E752AA603}" type="datetimeFigureOut">
               <a:rPr lang="en-US" smtClean="0"/>
-              <a:t>8/1/2023</a:t>
+              <a:t>1/9/2024</a:t>
             </a:fld>
             <a:endParaRPr lang="en-US"/>
           </a:p>
@@ -1622,7 +1622,7 @@
           <a:p>
             <a:fld id="{076171DA-D5DD-486B-A5F5-158E752AA603}" type="datetimeFigureOut">
               <a:rPr lang="en-US" smtClean="0"/>
-              <a:t>8/1/2023</a:t>
+              <a:t>1/9/2024</a:t>
             </a:fld>
             <a:endParaRPr lang="en-US"/>
           </a:p>
@@ -1740,7 +1740,7 @@
           <a:p>
             <a:fld id="{076171DA-D5DD-486B-A5F5-158E752AA603}" type="datetimeFigureOut">
               <a:rPr lang="en-US" smtClean="0"/>
-              <a:t>8/1/2023</a:t>
+              <a:t>1/9/2024</a:t>
             </a:fld>
             <a:endParaRPr lang="en-US"/>
           </a:p>
@@ -1835,7 +1835,7 @@
           <a:p>
             <a:fld id="{076171DA-D5DD-486B-A5F5-158E752AA603}" type="datetimeFigureOut">
               <a:rPr lang="en-US" smtClean="0"/>
-              <a:t>8/1/2023</a:t>
+              <a:t>1/9/2024</a:t>
             </a:fld>
             <a:endParaRPr lang="en-US"/>
           </a:p>
@@ -2112,7 +2112,7 @@
           <a:p>
             <a:fld id="{076171DA-D5DD-486B-A5F5-158E752AA603}" type="datetimeFigureOut">
               <a:rPr lang="en-US" smtClean="0"/>
-              <a:t>8/1/2023</a:t>
+              <a:t>1/9/2024</a:t>
             </a:fld>
             <a:endParaRPr lang="en-US"/>
           </a:p>
@@ -2365,7 +2365,7 @@
           <a:p>
             <a:fld id="{076171DA-D5DD-486B-A5F5-158E752AA603}" type="datetimeFigureOut">
               <a:rPr lang="en-US" smtClean="0"/>
-              <a:t>8/1/2023</a:t>
+              <a:t>1/9/2024</a:t>
             </a:fld>
             <a:endParaRPr lang="en-US"/>
           </a:p>
@@ -2578,7 +2578,7 @@
           <a:p>
             <a:fld id="{076171DA-D5DD-486B-A5F5-158E752AA603}" type="datetimeFigureOut">
               <a:rPr lang="en-US" smtClean="0"/>
-              <a:t>8/1/2023</a:t>
+              <a:t>1/9/2024</a:t>
             </a:fld>
             <a:endParaRPr lang="en-US"/>
           </a:p>
@@ -3263,8 +3263,8 @@
           </p:nvSpPr>
           <p:spPr>
             <a:xfrm>
-              <a:off x="2354389" y="4071682"/>
-              <a:ext cx="750168" cy="409911"/>
+              <a:off x="2307723" y="4071682"/>
+              <a:ext cx="843501" cy="461665"/>
             </a:xfrm>
             <a:prstGeom prst="rect">
               <a:avLst/>
@@ -3286,7 +3286,7 @@
                 </a:spcAft>
               </a:pPr>
               <a:r>
-                <a:rPr lang="en-US" sz="1300" b="1" dirty="0" smtClean="0">
+                <a:rPr lang="en-US" sz="1200" b="1" dirty="0" smtClean="0">
                   <a:solidFill>
                     <a:srgbClr val="5E676E"/>
                   </a:solidFill>
@@ -3306,7 +3306,7 @@
                 </a:spcAft>
               </a:pPr>
               <a:r>
-                <a:rPr lang="en-US" sz="1300" b="1" dirty="0" smtClean="0">
+                <a:rPr lang="en-US" sz="1200" b="1" dirty="0" smtClean="0">
                   <a:solidFill>
                     <a:srgbClr val="5E676E"/>
                   </a:solidFill>
@@ -3315,7 +3315,7 @@
                 </a:rPr>
                 <a:t>model</a:t>
               </a:r>
-              <a:endParaRPr lang="en-US" sz="1300" b="1" dirty="0">
+              <a:endParaRPr lang="en-US" sz="1200" b="1" dirty="0">
                 <a:solidFill>
                   <a:srgbClr val="5E676E"/>
                 </a:solidFill>
@@ -3553,7 +3553,7 @@
           <p:spPr>
             <a:xfrm>
               <a:off x="9078350" y="3177523"/>
-              <a:ext cx="1145489" cy="576437"/>
+              <a:ext cx="1145489" cy="646331"/>
             </a:xfrm>
             <a:prstGeom prst="rect">
               <a:avLst/>
@@ -3575,7 +3575,7 @@
                 </a:spcAft>
               </a:pPr>
               <a:r>
-                <a:rPr lang="sv-SE" sz="1300" dirty="0" err="1">
+                <a:rPr lang="sv-SE" sz="1200" b="1" dirty="0" err="1">
                   <a:solidFill>
                     <a:srgbClr val="00B050"/>
                   </a:solidFill>
@@ -3585,7 +3585,7 @@
                 <a:t>t</a:t>
               </a:r>
               <a:r>
-                <a:rPr lang="sv-SE" sz="1300" dirty="0" err="1" smtClean="0">
+                <a:rPr lang="sv-SE" sz="1200" b="1" dirty="0" err="1" smtClean="0">
                   <a:solidFill>
                     <a:srgbClr val="00B050"/>
                   </a:solidFill>
@@ -3595,7 +3595,7 @@
                 <a:t>esting</a:t>
               </a:r>
               <a:r>
-                <a:rPr lang="sv-SE" sz="1300" dirty="0" smtClean="0">
+                <a:rPr lang="sv-SE" sz="1200" b="1" dirty="0" smtClean="0">
                   <a:solidFill>
                     <a:srgbClr val="00B050"/>
                   </a:solidFill>
@@ -3615,7 +3615,7 @@
                 </a:spcAft>
               </a:pPr>
               <a:r>
-                <a:rPr lang="sv-SE" sz="1300" dirty="0">
+                <a:rPr lang="sv-SE" sz="1200" b="1" dirty="0">
                   <a:solidFill>
                     <a:srgbClr val="00B050"/>
                   </a:solidFill>
@@ -3625,7 +3625,7 @@
                 <a:t>s</a:t>
               </a:r>
               <a:r>
-                <a:rPr lang="sv-SE" sz="1300" dirty="0" smtClean="0">
+                <a:rPr lang="sv-SE" sz="1200" b="1" dirty="0" smtClean="0">
                   <a:solidFill>
                     <a:srgbClr val="00B050"/>
                   </a:solidFill>
@@ -3635,7 +3635,7 @@
                 <a:t>ystem </a:t>
               </a:r>
               <a:r>
-                <a:rPr lang="sv-SE" sz="1300" dirty="0">
+                <a:rPr lang="sv-SE" sz="1200" b="1" dirty="0">
                   <a:solidFill>
                     <a:srgbClr val="00B050"/>
                   </a:solidFill>
@@ -3644,7 +3644,7 @@
                 </a:rPr>
                 <a:t>integration</a:t>
               </a:r>
-              <a:endParaRPr lang="en-US" sz="1300" dirty="0">
+              <a:endParaRPr lang="en-US" sz="1200" b="1" dirty="0">
                 <a:solidFill>
                   <a:srgbClr val="00B050"/>
                 </a:solidFill>
@@ -4359,8 +4359,8 @@
           </p:nvSpPr>
           <p:spPr>
             <a:xfrm>
-              <a:off x="6822530" y="3075963"/>
-              <a:ext cx="723801" cy="166526"/>
+              <a:off x="6431023" y="3057491"/>
+              <a:ext cx="1506823" cy="369332"/>
             </a:xfrm>
             <a:prstGeom prst="rect">
               <a:avLst/>
@@ -4389,16 +4389,55 @@
                 </a:spcAft>
               </a:pPr>
               <a:r>
-                <a:rPr lang="sv-SE" sz="1300" b="1" dirty="0" smtClean="0">
+                <a:rPr lang="sv-SE" sz="1200" b="1" dirty="0" smtClean="0">
                   <a:solidFill>
                     <a:srgbClr val="5E676E"/>
                   </a:solidFill>
                   <a:latin typeface="Arial" panose="020B0604020202020204" pitchFamily="34" charset="0"/>
                   <a:cs typeface="Arial" panose="020B0604020202020204" pitchFamily="34" charset="0"/>
                 </a:rPr>
-                <a:t>CATIA ESP</a:t>
+                <a:t>Software </a:t>
               </a:r>
-              <a:endParaRPr sz="1300" b="1" dirty="0">
+              <a:r>
+                <a:rPr lang="sv-SE" sz="1200" b="1" dirty="0" err="1" smtClean="0">
+                  <a:solidFill>
+                    <a:srgbClr val="5E676E"/>
+                  </a:solidFill>
+                  <a:latin typeface="Arial" panose="020B0604020202020204" pitchFamily="34" charset="0"/>
+                  <a:cs typeface="Arial" panose="020B0604020202020204" pitchFamily="34" charset="0"/>
+                </a:rPr>
+                <a:t>Production</a:t>
+              </a:r>
+              <a:r>
+                <a:rPr lang="sv-SE" sz="1200" b="1" dirty="0" smtClean="0">
+                  <a:solidFill>
+                    <a:srgbClr val="5E676E"/>
+                  </a:solidFill>
+                  <a:latin typeface="Arial" panose="020B0604020202020204" pitchFamily="34" charset="0"/>
+                  <a:cs typeface="Arial" panose="020B0604020202020204" pitchFamily="34" charset="0"/>
+                </a:rPr>
+                <a:t/>
+              </a:r>
+              <a:br>
+                <a:rPr lang="sv-SE" sz="1200" b="1" dirty="0" smtClean="0">
+                  <a:solidFill>
+                    <a:srgbClr val="5E676E"/>
+                  </a:solidFill>
+                  <a:latin typeface="Arial" panose="020B0604020202020204" pitchFamily="34" charset="0"/>
+                  <a:cs typeface="Arial" panose="020B0604020202020204" pitchFamily="34" charset="0"/>
+                </a:rPr>
+              </a:br>
+              <a:r>
+                <a:rPr lang="sv-SE" sz="1200" b="1" dirty="0" err="1" smtClean="0">
+                  <a:solidFill>
+                    <a:srgbClr val="5E676E"/>
+                  </a:solidFill>
+                  <a:latin typeface="Arial" panose="020B0604020202020204" pitchFamily="34" charset="0"/>
+                  <a:cs typeface="Arial" panose="020B0604020202020204" pitchFamily="34" charset="0"/>
+                </a:rPr>
+                <a:t>Engineering</a:t>
+              </a:r>
+              <a:endParaRPr sz="1200" b="1" dirty="0">
                 <a:solidFill>
                   <a:srgbClr val="5E676E"/>
                 </a:solidFill>
@@ -4446,8 +4485,8 @@
           </p:nvSpPr>
           <p:spPr>
             <a:xfrm>
-              <a:off x="3507919" y="4399624"/>
-              <a:ext cx="798824" cy="243385"/>
+              <a:off x="3507919" y="4418096"/>
+              <a:ext cx="798824" cy="276999"/>
             </a:xfrm>
             <a:prstGeom prst="rect">
               <a:avLst/>
@@ -4469,7 +4508,7 @@
                 </a:spcAft>
               </a:pPr>
               <a:r>
-                <a:rPr lang="en-US" sz="1300" b="1" dirty="0" err="1" smtClean="0">
+                <a:rPr lang="en-US" sz="1200" b="1" dirty="0" err="1" smtClean="0">
                   <a:solidFill>
                     <a:srgbClr val="5E676E"/>
                   </a:solidFill>
@@ -4478,7 +4517,7 @@
                 </a:rPr>
                 <a:t>Dymola</a:t>
               </a:r>
-              <a:endParaRPr lang="en-US" sz="1300" b="1" dirty="0">
+              <a:endParaRPr lang="en-US" sz="1200" b="1" dirty="0">
                 <a:solidFill>
                   <a:srgbClr val="5E676E"/>
                 </a:solidFill>
@@ -4526,8 +4565,8 @@
           </p:nvSpPr>
           <p:spPr>
             <a:xfrm>
-              <a:off x="3487139" y="2966930"/>
-              <a:ext cx="917548" cy="243385"/>
+              <a:off x="3430932" y="2985402"/>
+              <a:ext cx="1029962" cy="276999"/>
             </a:xfrm>
             <a:prstGeom prst="rect">
               <a:avLst/>
@@ -4549,7 +4588,7 @@
                 </a:spcAft>
               </a:pPr>
               <a:r>
-                <a:rPr lang="en-US" sz="1300" b="1" dirty="0" smtClean="0">
+                <a:rPr lang="en-US" sz="1200" b="1" dirty="0" smtClean="0">
                   <a:solidFill>
                     <a:srgbClr val="5E676E"/>
                   </a:solidFill>
@@ -4558,7 +4597,7 @@
                 </a:rPr>
                 <a:t>CATIA DBM</a:t>
               </a:r>
-              <a:endParaRPr lang="en-US" sz="1300" b="1" dirty="0">
+              <a:endParaRPr lang="en-US" sz="1200" b="1" dirty="0">
                 <a:solidFill>
                   <a:srgbClr val="5E676E"/>
                 </a:solidFill>
@@ -4740,8 +4779,8 @@
           </p:nvSpPr>
           <p:spPr>
             <a:xfrm>
-              <a:off x="6454753" y="4550649"/>
-              <a:ext cx="1442896" cy="200055"/>
+              <a:off x="6510730" y="4550649"/>
+              <a:ext cx="1330941" cy="184666"/>
             </a:xfrm>
             <a:prstGeom prst="rect">
               <a:avLst/>
@@ -4770,7 +4809,7 @@
                 </a:spcAft>
               </a:pPr>
               <a:r>
-                <a:rPr lang="sv-SE" sz="1300" b="1" dirty="0" smtClean="0">
+                <a:rPr lang="sv-SE" sz="1200" b="1" dirty="0" smtClean="0">
                   <a:solidFill>
                     <a:srgbClr val="5E676E"/>
                   </a:solidFill>
@@ -4780,7 +4819,7 @@
                 <a:t>AUTOSAR </a:t>
               </a:r>
               <a:r>
-                <a:rPr lang="sv-SE" sz="1300" b="1" dirty="0" err="1" smtClean="0">
+                <a:rPr lang="sv-SE" sz="1200" b="1" dirty="0" err="1" smtClean="0">
                   <a:solidFill>
                     <a:srgbClr val="5E676E"/>
                   </a:solidFill>
@@ -4789,7 +4828,7 @@
                 </a:rPr>
                 <a:t>Builder</a:t>
               </a:r>
-              <a:endParaRPr sz="1300" b="1" dirty="0">
+              <a:endParaRPr sz="1200" b="1" dirty="0">
                 <a:solidFill>
                   <a:srgbClr val="5E676E"/>
                 </a:solidFill>

</xml_diff>

<commit_message>
Updated existing tooling figure.
</commit_message>
<xml_diff>
--- a/static/media/tools/eFMI-tools.pptx
+++ b/static/media/tools/eFMI-tools.pptx
@@ -255,7 +255,7 @@
           <a:p>
             <a:fld id="{076171DA-D5DD-486B-A5F5-158E752AA603}" type="datetimeFigureOut">
               <a:rPr lang="en-US" smtClean="0"/>
-              <a:t>12/18/2024</a:t>
+              <a:t>12/19/2024</a:t>
             </a:fld>
             <a:endParaRPr lang="en-US"/>
           </a:p>
@@ -423,7 +423,7 @@
           <a:p>
             <a:fld id="{076171DA-D5DD-486B-A5F5-158E752AA603}" type="datetimeFigureOut">
               <a:rPr lang="en-US" smtClean="0"/>
-              <a:t>12/18/2024</a:t>
+              <a:t>12/19/2024</a:t>
             </a:fld>
             <a:endParaRPr lang="en-US"/>
           </a:p>
@@ -601,7 +601,7 @@
           <a:p>
             <a:fld id="{076171DA-D5DD-486B-A5F5-158E752AA603}" type="datetimeFigureOut">
               <a:rPr lang="en-US" smtClean="0"/>
-              <a:t>12/18/2024</a:t>
+              <a:t>12/19/2024</a:t>
             </a:fld>
             <a:endParaRPr lang="en-US"/>
           </a:p>
@@ -769,7 +769,7 @@
           <a:p>
             <a:fld id="{076171DA-D5DD-486B-A5F5-158E752AA603}" type="datetimeFigureOut">
               <a:rPr lang="en-US" smtClean="0"/>
-              <a:t>12/18/2024</a:t>
+              <a:t>12/19/2024</a:t>
             </a:fld>
             <a:endParaRPr lang="en-US"/>
           </a:p>
@@ -1014,7 +1014,7 @@
           <a:p>
             <a:fld id="{076171DA-D5DD-486B-A5F5-158E752AA603}" type="datetimeFigureOut">
               <a:rPr lang="en-US" smtClean="0"/>
-              <a:t>12/18/2024</a:t>
+              <a:t>12/19/2024</a:t>
             </a:fld>
             <a:endParaRPr lang="en-US"/>
           </a:p>
@@ -1243,7 +1243,7 @@
           <a:p>
             <a:fld id="{076171DA-D5DD-486B-A5F5-158E752AA603}" type="datetimeFigureOut">
               <a:rPr lang="en-US" smtClean="0"/>
-              <a:t>12/18/2024</a:t>
+              <a:t>12/19/2024</a:t>
             </a:fld>
             <a:endParaRPr lang="en-US"/>
           </a:p>
@@ -1607,7 +1607,7 @@
           <a:p>
             <a:fld id="{076171DA-D5DD-486B-A5F5-158E752AA603}" type="datetimeFigureOut">
               <a:rPr lang="en-US" smtClean="0"/>
-              <a:t>12/18/2024</a:t>
+              <a:t>12/19/2024</a:t>
             </a:fld>
             <a:endParaRPr lang="en-US"/>
           </a:p>
@@ -1724,7 +1724,7 @@
           <a:p>
             <a:fld id="{076171DA-D5DD-486B-A5F5-158E752AA603}" type="datetimeFigureOut">
               <a:rPr lang="en-US" smtClean="0"/>
-              <a:t>12/18/2024</a:t>
+              <a:t>12/19/2024</a:t>
             </a:fld>
             <a:endParaRPr lang="en-US"/>
           </a:p>
@@ -1819,7 +1819,7 @@
           <a:p>
             <a:fld id="{076171DA-D5DD-486B-A5F5-158E752AA603}" type="datetimeFigureOut">
               <a:rPr lang="en-US" smtClean="0"/>
-              <a:t>12/18/2024</a:t>
+              <a:t>12/19/2024</a:t>
             </a:fld>
             <a:endParaRPr lang="en-US"/>
           </a:p>
@@ -2094,7 +2094,7 @@
           <a:p>
             <a:fld id="{076171DA-D5DD-486B-A5F5-158E752AA603}" type="datetimeFigureOut">
               <a:rPr lang="en-US" smtClean="0"/>
-              <a:t>12/18/2024</a:t>
+              <a:t>12/19/2024</a:t>
             </a:fld>
             <a:endParaRPr lang="en-US"/>
           </a:p>
@@ -2346,7 +2346,7 @@
           <a:p>
             <a:fld id="{076171DA-D5DD-486B-A5F5-158E752AA603}" type="datetimeFigureOut">
               <a:rPr lang="en-US" smtClean="0"/>
-              <a:t>12/18/2024</a:t>
+              <a:t>12/19/2024</a:t>
             </a:fld>
             <a:endParaRPr lang="en-US"/>
           </a:p>
@@ -2557,7 +2557,7 @@
           <a:p>
             <a:fld id="{076171DA-D5DD-486B-A5F5-158E752AA603}" type="datetimeFigureOut">
               <a:rPr lang="en-US" smtClean="0"/>
-              <a:t>12/18/2024</a:t>
+              <a:t>12/19/2024</a:t>
             </a:fld>
             <a:endParaRPr lang="en-US"/>
           </a:p>
@@ -2962,52 +2962,160 @@
           <a:chExt cx="0" cy="0"/>
         </a:xfrm>
       </p:grpSpPr>
-      <p:cxnSp>
-        <p:nvCxnSpPr>
-          <p:cNvPr id="105" name="Connector: Elbow 104">
+      <p:sp>
+        <p:nvSpPr>
+          <p:cNvPr id="126" name="Isosceles Triangle 125">
             <a:extLst>
               <a:ext uri="{FF2B5EF4-FFF2-40B4-BE49-F238E27FC236}">
-                <a16:creationId xmlns:a16="http://schemas.microsoft.com/office/drawing/2014/main" id="{DD7357C7-45BF-4B32-878E-2B29C1CE973B}"/>
+                <a16:creationId xmlns:a16="http://schemas.microsoft.com/office/drawing/2014/main" id="{DA209C68-37CB-41EF-BBB7-FC19B46B6FEA}"/>
               </a:ext>
             </a:extLst>
           </p:cNvPr>
-          <p:cNvCxnSpPr/>
+          <p:cNvSpPr/>
           <p:nvPr/>
-        </p:nvCxnSpPr>
-        <p:spPr>
-          <a:xfrm rot="5400000">
-            <a:off x="4021358" y="3593537"/>
-            <a:ext cx="1379308" cy="163038"/>
-          </a:xfrm>
-          <a:prstGeom prst="bentConnector3">
+        </p:nvSpPr>
+        <p:spPr bwMode="auto">
+          <a:xfrm rot="18591364">
+            <a:off x="2336310" y="4688813"/>
+            <a:ext cx="310894" cy="156653"/>
+          </a:xfrm>
+          <a:prstGeom prst="triangle">
             <a:avLst>
-              <a:gd name="adj1" fmla="val 279"/>
+              <a:gd name="adj" fmla="val 51093"/>
             </a:avLst>
           </a:prstGeom>
-          <a:ln w="25400">
-            <a:solidFill>
-              <a:srgbClr val="00B050"/>
-            </a:solidFill>
+          <a:solidFill>
+            <a:srgbClr val="E5E6E8"/>
+          </a:solidFill>
+          <a:ln w="9525" cap="flat" cmpd="sng" algn="ctr">
+            <a:noFill/>
             <a:prstDash val="solid"/>
-            <a:headEnd type="none"/>
-            <a:tailEnd type="none"/>
+            <a:round/>
+            <a:headEnd type="none" w="med" len="med"/>
+            <a:tailEnd type="arrow" w="med" len="med"/>
           </a:ln>
-        </p:spPr>
-        <p:style>
-          <a:lnRef idx="1">
-            <a:schemeClr val="accent1"/>
-          </a:lnRef>
-          <a:fillRef idx="0">
-            <a:schemeClr val="accent1"/>
-          </a:fillRef>
-          <a:effectRef idx="0">
-            <a:schemeClr val="accent1"/>
-          </a:effectRef>
-          <a:fontRef idx="minor">
-            <a:schemeClr val="tx1"/>
-          </a:fontRef>
-        </p:style>
-      </p:cxnSp>
+          <a:effectLst/>
+        </p:spPr>
+        <p:txBody>
+          <a:bodyPr vert="horz" wrap="square" lIns="90000" tIns="46800" rIns="36000" bIns="46800" numCol="1" rtlCol="0" anchor="t" anchorCtr="0" compatLnSpc="1">
+            <a:prstTxWarp prst="textNoShape">
+              <a:avLst/>
+            </a:prstTxWarp>
+            <a:spAutoFit/>
+          </a:bodyPr>
+          <a:lstStyle/>
+          <a:p>
+            <a:pPr marL="0" marR="0" lvl="0" indent="0" defTabSz="914400" eaLnBrk="0" fontAlgn="base" latinLnBrk="0" hangingPunct="0">
+              <a:lnSpc>
+                <a:spcPct val="100000"/>
+              </a:lnSpc>
+              <a:spcBef>
+                <a:spcPct val="50000"/>
+              </a:spcBef>
+              <a:spcAft>
+                <a:spcPct val="0"/>
+              </a:spcAft>
+              <a:buClrTx/>
+              <a:buSzTx/>
+              <a:buFontTx/>
+              <a:buNone/>
+              <a:tabLst/>
+              <a:defRPr/>
+            </a:pPr>
+            <a:endParaRPr kumimoji="0" lang="en-US" sz="1600" b="0" i="0" u="none" strike="noStrike" kern="0" cap="none" spc="0" normalizeH="0" baseline="0" noProof="0">
+              <a:ln>
+                <a:noFill/>
+              </a:ln>
+              <a:solidFill>
+                <a:srgbClr val="120C80"/>
+              </a:solidFill>
+              <a:effectLst/>
+              <a:uLnTx/>
+              <a:uFillTx/>
+              <a:latin typeface="Arial" charset="0"/>
+              <a:cs typeface="Arial" charset="0"/>
+            </a:endParaRPr>
+          </a:p>
+        </p:txBody>
+      </p:sp>
+      <p:sp>
+        <p:nvSpPr>
+          <p:cNvPr id="125" name="Block Arc 124">
+            <a:extLst>
+              <a:ext uri="{FF2B5EF4-FFF2-40B4-BE49-F238E27FC236}">
+                <a16:creationId xmlns:a16="http://schemas.microsoft.com/office/drawing/2014/main" id="{88EF98FD-1B06-42E9-8C38-807E03EE1DEB}"/>
+              </a:ext>
+            </a:extLst>
+          </p:cNvPr>
+          <p:cNvSpPr/>
+          <p:nvPr/>
+        </p:nvSpPr>
+        <p:spPr bwMode="auto">
+          <a:xfrm rot="10800000">
+            <a:off x="2307978" y="3814290"/>
+            <a:ext cx="1142268" cy="1209159"/>
+          </a:xfrm>
+          <a:prstGeom prst="blockArc">
+            <a:avLst>
+              <a:gd name="adj1" fmla="val 20700548"/>
+              <a:gd name="adj2" fmla="val 18571853"/>
+              <a:gd name="adj3" fmla="val 13492"/>
+            </a:avLst>
+          </a:prstGeom>
+          <a:solidFill>
+            <a:srgbClr val="E5E6E8"/>
+          </a:solidFill>
+          <a:ln w="9525" cap="flat" cmpd="sng" algn="ctr">
+            <a:noFill/>
+            <a:prstDash val="solid"/>
+            <a:round/>
+            <a:headEnd type="none" w="med" len="med"/>
+            <a:tailEnd type="arrow" w="med" len="med"/>
+          </a:ln>
+          <a:effectLst/>
+        </p:spPr>
+        <p:txBody>
+          <a:bodyPr vert="horz" wrap="square" lIns="90000" tIns="46800" rIns="36000" bIns="46800" numCol="1" rtlCol="0" anchor="t" anchorCtr="0" compatLnSpc="1">
+            <a:prstTxWarp prst="textNoShape">
+              <a:avLst/>
+            </a:prstTxWarp>
+            <a:spAutoFit/>
+          </a:bodyPr>
+          <a:lstStyle/>
+          <a:p>
+            <a:pPr marL="0" marR="0" lvl="0" indent="0" defTabSz="914400" eaLnBrk="0" fontAlgn="base" latinLnBrk="0" hangingPunct="0">
+              <a:lnSpc>
+                <a:spcPct val="100000"/>
+              </a:lnSpc>
+              <a:spcBef>
+                <a:spcPct val="50000"/>
+              </a:spcBef>
+              <a:spcAft>
+                <a:spcPct val="0"/>
+              </a:spcAft>
+              <a:buClrTx/>
+              <a:buSzTx/>
+              <a:buFontTx/>
+              <a:buNone/>
+              <a:tabLst/>
+              <a:defRPr/>
+            </a:pPr>
+            <a:endParaRPr kumimoji="0" lang="en-US" sz="1600" b="0" i="0" u="none" strike="noStrike" kern="0" cap="none" spc="0" normalizeH="0" baseline="0" noProof="0">
+              <a:ln>
+                <a:noFill/>
+              </a:ln>
+              <a:solidFill>
+                <a:srgbClr val="120C80"/>
+              </a:solidFill>
+              <a:effectLst/>
+              <a:uLnTx/>
+              <a:uFillTx/>
+              <a:latin typeface="Arial" charset="0"/>
+              <a:cs typeface="Arial" charset="0"/>
+            </a:endParaRPr>
+          </a:p>
+        </p:txBody>
+      </p:sp>
       <p:sp>
         <p:nvSpPr>
           <p:cNvPr id="6" name="Block Arc 5"/>
@@ -3080,6 +3188,106 @@
           </a:p>
         </p:txBody>
       </p:sp>
+      <p:sp>
+        <p:nvSpPr>
+          <p:cNvPr id="34" name="Rectangle 33">
+            <a:extLst>
+              <a:ext uri="{FF2B5EF4-FFF2-40B4-BE49-F238E27FC236}">
+                <a16:creationId xmlns:a16="http://schemas.microsoft.com/office/drawing/2014/main" id="{AF96B3EC-AB20-445F-A5A5-58A3382985F4}"/>
+              </a:ext>
+            </a:extLst>
+          </p:cNvPr>
+          <p:cNvSpPr/>
+          <p:nvPr/>
+        </p:nvSpPr>
+        <p:spPr>
+          <a:xfrm>
+            <a:off x="8292984" y="3612904"/>
+            <a:ext cx="1342169" cy="1559842"/>
+          </a:xfrm>
+          <a:prstGeom prst="rect">
+            <a:avLst/>
+          </a:prstGeom>
+          <a:solidFill>
+            <a:schemeClr val="bg1"/>
+          </a:solidFill>
+          <a:ln w="15875">
+            <a:solidFill>
+              <a:srgbClr val="FF0000"/>
+            </a:solidFill>
+          </a:ln>
+        </p:spPr>
+        <p:style>
+          <a:lnRef idx="2">
+            <a:schemeClr val="accent1">
+              <a:shade val="50000"/>
+            </a:schemeClr>
+          </a:lnRef>
+          <a:fillRef idx="1">
+            <a:schemeClr val="accent1"/>
+          </a:fillRef>
+          <a:effectRef idx="0">
+            <a:schemeClr val="accent1"/>
+          </a:effectRef>
+          <a:fontRef idx="minor">
+            <a:schemeClr val="lt1"/>
+          </a:fontRef>
+        </p:style>
+        <p:txBody>
+          <a:bodyPr rtlCol="0" anchor="ctr"/>
+          <a:lstStyle/>
+          <a:p>
+            <a:pPr algn="ctr"/>
+            <a:endParaRPr lang="en-150"/>
+          </a:p>
+        </p:txBody>
+      </p:sp>
+      <p:cxnSp>
+        <p:nvCxnSpPr>
+          <p:cNvPr id="105" name="Connector: Elbow 104">
+            <a:extLst>
+              <a:ext uri="{FF2B5EF4-FFF2-40B4-BE49-F238E27FC236}">
+                <a16:creationId xmlns:a16="http://schemas.microsoft.com/office/drawing/2014/main" id="{DD7357C7-45BF-4B32-878E-2B29C1CE973B}"/>
+              </a:ext>
+            </a:extLst>
+          </p:cNvPr>
+          <p:cNvCxnSpPr/>
+          <p:nvPr/>
+        </p:nvCxnSpPr>
+        <p:spPr>
+          <a:xfrm rot="5400000">
+            <a:off x="4021358" y="3593537"/>
+            <a:ext cx="1379308" cy="163038"/>
+          </a:xfrm>
+          <a:prstGeom prst="bentConnector3">
+            <a:avLst>
+              <a:gd name="adj1" fmla="val 279"/>
+            </a:avLst>
+          </a:prstGeom>
+          <a:ln w="25400">
+            <a:solidFill>
+              <a:srgbClr val="00B050"/>
+            </a:solidFill>
+            <a:prstDash val="solid"/>
+            <a:headEnd type="none"/>
+            <a:tailEnd type="none"/>
+          </a:ln>
+        </p:spPr>
+        <p:style>
+          <a:lnRef idx="1">
+            <a:schemeClr val="accent1"/>
+          </a:lnRef>
+          <a:fillRef idx="0">
+            <a:schemeClr val="accent1"/>
+          </a:fillRef>
+          <a:effectRef idx="0">
+            <a:schemeClr val="accent1"/>
+          </a:effectRef>
+          <a:fontRef idx="minor">
+            <a:schemeClr val="tx1"/>
+          </a:fontRef>
+        </p:style>
+      </p:cxnSp>
       <p:cxnSp>
         <p:nvCxnSpPr>
           <p:cNvPr id="39" name="Gewinkelte Verbindung 26"/>
@@ -3132,7 +3340,7 @@
         </p:blipFill>
         <p:spPr>
           <a:xfrm>
-            <a:off x="8630493" y="2271526"/>
+            <a:off x="8614574" y="2276467"/>
             <a:ext cx="1017902" cy="340483"/>
           </a:xfrm>
           <a:prstGeom prst="rect">
@@ -3148,7 +3356,7 @@
         </p:nvSpPr>
         <p:spPr bwMode="auto">
           <a:xfrm rot="21273394">
-            <a:off x="3455879" y="3425015"/>
+            <a:off x="3444763" y="3425015"/>
             <a:ext cx="585548" cy="362639"/>
           </a:xfrm>
           <a:prstGeom prst="triangle">
@@ -3210,78 +3418,24 @@
           </a:p>
         </p:txBody>
       </p:sp>
-      <p:pic>
-        <p:nvPicPr>
-          <p:cNvPr id="9" name="Picture 2"/>
-          <p:cNvPicPr>
-            <a:picLocks noChangeAspect="1" noChangeArrowheads="1"/>
-          </p:cNvPicPr>
+      <p:sp>
+        <p:nvSpPr>
+          <p:cNvPr id="10" name="TextBox 9"/>
+          <p:cNvSpPr txBox="1"/>
           <p:nvPr/>
-        </p:nvPicPr>
-        <p:blipFill>
-          <a:blip r:embed="rId7">
-            <a:extLst>
-              <a:ext uri="{28A0092B-C50C-407E-A947-70E740481C1C}">
-                <a14:useLocalDpi xmlns:a14="http://schemas.microsoft.com/office/drawing/2010/main" val="0"/>
-              </a:ext>
-            </a:extLst>
-          </a:blip>
-          <a:srcRect/>
-          <a:stretch>
-            <a:fillRect/>
-          </a:stretch>
-        </p:blipFill>
-        <p:spPr bwMode="auto">
+        </p:nvSpPr>
+        <p:spPr>
           <a:xfrm>
-            <a:off x="2235200" y="3087936"/>
-            <a:ext cx="988547" cy="979450"/>
+            <a:off x="2410216" y="4036762"/>
+            <a:ext cx="658835" cy="369332"/>
           </a:xfrm>
           <a:prstGeom prst="rect">
             <a:avLst/>
           </a:prstGeom>
           <a:noFill/>
-          <a:ln>
-            <a:noFill/>
-          </a:ln>
-          <a:extLst>
-            <a:ext uri="{909E8E84-426E-40DD-AFC4-6F175D3DCCD1}">
-              <a14:hiddenFill xmlns:a14="http://schemas.microsoft.com/office/drawing/2010/main">
-                <a:solidFill>
-                  <a:schemeClr val="accent1"/>
-                </a:solidFill>
-              </a14:hiddenFill>
-            </a:ext>
-            <a:ext uri="{91240B29-F687-4F45-9708-019B960494DF}">
-              <a14:hiddenLine xmlns:a14="http://schemas.microsoft.com/office/drawing/2010/main" w="9525">
-                <a:solidFill>
-                  <a:schemeClr val="tx1"/>
-                </a:solidFill>
-                <a:miter lim="800000"/>
-                <a:headEnd/>
-                <a:tailEnd/>
-              </a14:hiddenLine>
-            </a:ext>
-          </a:extLst>
-        </p:spPr>
-      </p:pic>
-      <p:sp>
-        <p:nvSpPr>
-          <p:cNvPr id="10" name="TextBox 9"/>
-          <p:cNvSpPr txBox="1"/>
-          <p:nvPr/>
-        </p:nvSpPr>
-        <p:spPr>
-          <a:xfrm>
-            <a:off x="2307723" y="4071682"/>
-            <a:ext cx="843501" cy="461665"/>
-          </a:xfrm>
-          <a:prstGeom prst="rect">
-            <a:avLst/>
-          </a:prstGeom>
-          <a:noFill/>
-        </p:spPr>
-        <p:txBody>
-          <a:bodyPr wrap="none" rtlCol="0">
+        </p:spPr>
+        <p:txBody>
+          <a:bodyPr wrap="none" lIns="0" tIns="0" rIns="0" bIns="0" rtlCol="0">
             <a:spAutoFit/>
           </a:bodyPr>
           <a:lstStyle/>
@@ -3338,12 +3492,12 @@
         </p:nvCxnSpPr>
         <p:spPr>
           <a:xfrm flipH="1">
-            <a:off x="6185834" y="2822321"/>
-            <a:ext cx="1263052" cy="1075750"/>
+            <a:off x="6195918" y="2822321"/>
+            <a:ext cx="1252968" cy="1152779"/>
           </a:xfrm>
           <a:prstGeom prst="bentConnector3">
             <a:avLst>
-              <a:gd name="adj1" fmla="val -44619"/>
+              <a:gd name="adj1" fmla="val -45106"/>
             </a:avLst>
           </a:prstGeom>
           <a:noFill/>
@@ -3370,7 +3524,7 @@
           </p:nvPr>
         </p:nvPicPr>
         <p:blipFill rotWithShape="1">
-          <a:blip r:embed="rId8" cstate="print">
+          <a:blip r:embed="rId7" cstate="print">
             <a:extLst>
               <a:ext uri="{28A0092B-C50C-407E-A947-70E740481C1C}">
                 <a14:useLocalDpi xmlns:a14="http://schemas.microsoft.com/office/drawing/2010/main" val="0"/>
@@ -3382,16 +3536,14 @@
         </p:blipFill>
         <p:spPr>
           <a:xfrm>
-            <a:off x="8592744" y="3548729"/>
+            <a:off x="8431403" y="3663700"/>
             <a:ext cx="1120037" cy="719888"/>
           </a:xfrm>
           <a:prstGeom prst="rect">
             <a:avLst/>
           </a:prstGeom>
           <a:ln>
-            <a:solidFill>
-              <a:srgbClr val="FF0000"/>
-            </a:solidFill>
+            <a:noFill/>
           </a:ln>
         </p:spPr>
       </p:pic>
@@ -3399,7 +3551,6 @@
         <p:nvCxnSpPr>
           <p:cNvPr id="21" name="Gewinkelte Verbindung 26"/>
           <p:cNvCxnSpPr>
-            <a:stCxn id="9" idx="3"/>
             <a:endCxn id="32" idx="1"/>
           </p:cNvCxnSpPr>
           <p:nvPr/>
@@ -3436,12 +3587,12 @@
         </p:nvCxnSpPr>
         <p:spPr>
           <a:xfrm>
-            <a:off x="6190196" y="3443492"/>
-            <a:ext cx="408006" cy="206456"/>
+            <a:off x="6190196" y="3443493"/>
+            <a:ext cx="408005" cy="276306"/>
           </a:xfrm>
           <a:prstGeom prst="bentConnector3">
             <a:avLst>
-              <a:gd name="adj1" fmla="val 48057"/>
+              <a:gd name="adj1" fmla="val 48444"/>
             </a:avLst>
           </a:prstGeom>
           <a:noFill/>
@@ -3459,7 +3610,6 @@
         <p:nvCxnSpPr>
           <p:cNvPr id="33" name="Gewinkelte Verbindung 26"/>
           <p:cNvCxnSpPr>
-            <a:stCxn id="9" idx="3"/>
             <a:endCxn id="18" idx="1"/>
           </p:cNvCxnSpPr>
           <p:nvPr/>
@@ -3523,8 +3673,8 @@
         </p:nvSpPr>
         <p:spPr>
           <a:xfrm>
-            <a:off x="8827988" y="2815315"/>
-            <a:ext cx="1145489" cy="400110"/>
+            <a:off x="8292514" y="3305664"/>
+            <a:ext cx="539492" cy="307777"/>
           </a:xfrm>
           <a:prstGeom prst="rect">
             <a:avLst/>
@@ -3532,12 +3682,12 @@
           <a:noFill/>
         </p:spPr>
         <p:txBody>
-          <a:bodyPr wrap="square" rtlCol="0">
+          <a:bodyPr wrap="square" lIns="0" tIns="0" rIns="0" bIns="0" rtlCol="0">
             <a:spAutoFit/>
           </a:bodyPr>
           <a:lstStyle/>
           <a:p>
-            <a:pPr algn="ctr" eaLnBrk="0" fontAlgn="base" hangingPunct="0">
+            <a:pPr eaLnBrk="0" fontAlgn="base" hangingPunct="0">
               <a:spcBef>
                 <a:spcPct val="0"/>
               </a:spcBef>
@@ -4086,12 +4236,12 @@
         </p:nvCxnSpPr>
         <p:spPr>
           <a:xfrm rot="5400000" flipH="1" flipV="1">
-            <a:off x="5994337" y="2638390"/>
-            <a:ext cx="2561063" cy="2157901"/>
+            <a:off x="5901279" y="2744001"/>
+            <a:ext cx="2565404" cy="1951020"/>
           </a:xfrm>
           <a:prstGeom prst="bentConnector3">
             <a:avLst>
-              <a:gd name="adj1" fmla="val -581"/>
+              <a:gd name="adj1" fmla="val 62"/>
             </a:avLst>
           </a:prstGeom>
           <a:noFill/>
@@ -4115,7 +4265,7 @@
         </p:nvCxnSpPr>
         <p:spPr>
           <a:xfrm flipV="1">
-            <a:off x="6185834" y="2441768"/>
+            <a:off x="6169915" y="2446709"/>
             <a:ext cx="2444659" cy="180277"/>
           </a:xfrm>
           <a:prstGeom prst="bentConnector3">
@@ -4137,6 +4287,36 @@
       <p:pic>
         <p:nvPicPr>
           <p:cNvPr id="2" name="Picture 1"/>
+          <p:cNvPicPr>
+            <a:picLocks noChangeAspect="1"/>
+          </p:cNvPicPr>
+          <p:nvPr/>
+        </p:nvPicPr>
+        <p:blipFill>
+          <a:blip r:embed="rId8" cstate="print">
+            <a:extLst>
+              <a:ext uri="{28A0092B-C50C-407E-A947-70E740481C1C}">
+                <a14:useLocalDpi xmlns:a14="http://schemas.microsoft.com/office/drawing/2010/main" val="0"/>
+              </a:ext>
+            </a:extLst>
+          </a:blip>
+          <a:stretch>
+            <a:fillRect/>
+          </a:stretch>
+        </p:blipFill>
+        <p:spPr>
+          <a:xfrm>
+            <a:off x="6598201" y="3505901"/>
+            <a:ext cx="1186323" cy="427795"/>
+          </a:xfrm>
+          <a:prstGeom prst="rect">
+            <a:avLst/>
+          </a:prstGeom>
+        </p:spPr>
+      </p:pic>
+      <p:pic>
+        <p:nvPicPr>
+          <p:cNvPr id="76" name="Picture 75"/>
           <p:cNvPicPr>
             <a:picLocks noChangeAspect="1"/>
           </p:cNvPicPr>
@@ -4156,36 +4336,6 @@
         </p:blipFill>
         <p:spPr>
           <a:xfrm>
-            <a:off x="6598201" y="3436051"/>
-            <a:ext cx="1186323" cy="427795"/>
-          </a:xfrm>
-          <a:prstGeom prst="rect">
-            <a:avLst/>
-          </a:prstGeom>
-        </p:spPr>
-      </p:pic>
-      <p:pic>
-        <p:nvPicPr>
-          <p:cNvPr id="76" name="Picture 75"/>
-          <p:cNvPicPr>
-            <a:picLocks noChangeAspect="1"/>
-          </p:cNvPicPr>
-          <p:nvPr/>
-        </p:nvPicPr>
-        <p:blipFill>
-          <a:blip r:embed="rId10" cstate="print">
-            <a:extLst>
-              <a:ext uri="{28A0092B-C50C-407E-A947-70E740481C1C}">
-                <a14:useLocalDpi xmlns:a14="http://schemas.microsoft.com/office/drawing/2010/main" val="0"/>
-              </a:ext>
-            </a:extLst>
-          </a:blip>
-          <a:stretch>
-            <a:fillRect/>
-          </a:stretch>
-        </p:blipFill>
-        <p:spPr>
-          <a:xfrm>
             <a:off x="6931624" y="2563690"/>
             <a:ext cx="517262" cy="517262"/>
           </a:xfrm>
@@ -4287,6 +4437,86 @@
       <p:pic>
         <p:nvPicPr>
           <p:cNvPr id="32" name="Picture 31"/>
+          <p:cNvPicPr>
+            <a:picLocks noChangeAspect="1"/>
+          </p:cNvPicPr>
+          <p:nvPr/>
+        </p:nvPicPr>
+        <p:blipFill>
+          <a:blip r:embed="rId10">
+            <a:extLst>
+              <a:ext uri="{28A0092B-C50C-407E-A947-70E740481C1C}">
+                <a14:useLocalDpi xmlns:a14="http://schemas.microsoft.com/office/drawing/2010/main" val="0"/>
+              </a:ext>
+            </a:extLst>
+          </a:blip>
+          <a:stretch>
+            <a:fillRect/>
+          </a:stretch>
+        </p:blipFill>
+        <p:spPr>
+          <a:xfrm>
+            <a:off x="3588449" y="4020229"/>
+            <a:ext cx="637764" cy="410763"/>
+          </a:xfrm>
+          <a:prstGeom prst="rect">
+            <a:avLst/>
+          </a:prstGeom>
+        </p:spPr>
+      </p:pic>
+      <p:sp>
+        <p:nvSpPr>
+          <p:cNvPr id="78" name="TextBox 77"/>
+          <p:cNvSpPr txBox="1"/>
+          <p:nvPr/>
+        </p:nvSpPr>
+        <p:spPr>
+          <a:xfrm>
+            <a:off x="3507919" y="4418096"/>
+            <a:ext cx="798824" cy="276999"/>
+          </a:xfrm>
+          <a:prstGeom prst="rect">
+            <a:avLst/>
+          </a:prstGeom>
+          <a:noFill/>
+        </p:spPr>
+        <p:txBody>
+          <a:bodyPr wrap="square" lIns="0" rIns="0" rtlCol="0">
+            <a:spAutoFit/>
+          </a:bodyPr>
+          <a:lstStyle/>
+          <a:p>
+            <a:pPr algn="ctr" eaLnBrk="0" fontAlgn="base" hangingPunct="0">
+              <a:spcBef>
+                <a:spcPct val="0"/>
+              </a:spcBef>
+              <a:spcAft>
+                <a:spcPct val="0"/>
+              </a:spcAft>
+            </a:pPr>
+            <a:r>
+              <a:rPr lang="en-US" sz="1200" b="1" dirty="0" err="1">
+                <a:solidFill>
+                  <a:srgbClr val="5E676E"/>
+                </a:solidFill>
+                <a:latin typeface="Arial" panose="020B0604020202020204" pitchFamily="34" charset="0"/>
+                <a:cs typeface="Arial" panose="020B0604020202020204" pitchFamily="34" charset="0"/>
+              </a:rPr>
+              <a:t>Dymola</a:t>
+            </a:r>
+            <a:endParaRPr lang="en-US" sz="1200" b="1" dirty="0">
+              <a:solidFill>
+                <a:srgbClr val="5E676E"/>
+              </a:solidFill>
+              <a:latin typeface="Arial" panose="020B0604020202020204" pitchFamily="34" charset="0"/>
+              <a:cs typeface="Arial" panose="020B0604020202020204" pitchFamily="34" charset="0"/>
+            </a:endParaRPr>
+          </a:p>
+        </p:txBody>
+      </p:sp>
+      <p:pic>
+        <p:nvPicPr>
+          <p:cNvPr id="18" name="Picture 17"/>
           <p:cNvPicPr>
             <a:picLocks noChangeAspect="1"/>
           </p:cNvPicPr>
@@ -4306,86 +4536,6 @@
         </p:blipFill>
         <p:spPr>
           <a:xfrm>
-            <a:off x="3588449" y="4020229"/>
-            <a:ext cx="637764" cy="410763"/>
-          </a:xfrm>
-          <a:prstGeom prst="rect">
-            <a:avLst/>
-          </a:prstGeom>
-        </p:spPr>
-      </p:pic>
-      <p:sp>
-        <p:nvSpPr>
-          <p:cNvPr id="78" name="TextBox 77"/>
-          <p:cNvSpPr txBox="1"/>
-          <p:nvPr/>
-        </p:nvSpPr>
-        <p:spPr>
-          <a:xfrm>
-            <a:off x="3507919" y="4418096"/>
-            <a:ext cx="798824" cy="276999"/>
-          </a:xfrm>
-          <a:prstGeom prst="rect">
-            <a:avLst/>
-          </a:prstGeom>
-          <a:noFill/>
-        </p:spPr>
-        <p:txBody>
-          <a:bodyPr wrap="square" lIns="0" rIns="0" rtlCol="0">
-            <a:spAutoFit/>
-          </a:bodyPr>
-          <a:lstStyle/>
-          <a:p>
-            <a:pPr algn="ctr" eaLnBrk="0" fontAlgn="base" hangingPunct="0">
-              <a:spcBef>
-                <a:spcPct val="0"/>
-              </a:spcBef>
-              <a:spcAft>
-                <a:spcPct val="0"/>
-              </a:spcAft>
-            </a:pPr>
-            <a:r>
-              <a:rPr lang="en-US" sz="1200" b="1" dirty="0" err="1">
-                <a:solidFill>
-                  <a:srgbClr val="5E676E"/>
-                </a:solidFill>
-                <a:latin typeface="Arial" panose="020B0604020202020204" pitchFamily="34" charset="0"/>
-                <a:cs typeface="Arial" panose="020B0604020202020204" pitchFamily="34" charset="0"/>
-              </a:rPr>
-              <a:t>Dymola</a:t>
-            </a:r>
-            <a:endParaRPr lang="en-US" sz="1200" b="1" dirty="0">
-              <a:solidFill>
-                <a:srgbClr val="5E676E"/>
-              </a:solidFill>
-              <a:latin typeface="Arial" panose="020B0604020202020204" pitchFamily="34" charset="0"/>
-              <a:cs typeface="Arial" panose="020B0604020202020204" pitchFamily="34" charset="0"/>
-            </a:endParaRPr>
-          </a:p>
-        </p:txBody>
-      </p:sp>
-      <p:pic>
-        <p:nvPicPr>
-          <p:cNvPr id="18" name="Picture 17"/>
-          <p:cNvPicPr>
-            <a:picLocks noChangeAspect="1"/>
-          </p:cNvPicPr>
-          <p:nvPr/>
-        </p:nvPicPr>
-        <p:blipFill>
-          <a:blip r:embed="rId12">
-            <a:extLst>
-              <a:ext uri="{28A0092B-C50C-407E-A947-70E740481C1C}">
-                <a14:useLocalDpi xmlns:a14="http://schemas.microsoft.com/office/drawing/2010/main" val="0"/>
-              </a:ext>
-            </a:extLst>
-          </a:blip>
-          <a:stretch>
-            <a:fillRect/>
-          </a:stretch>
-        </p:blipFill>
-        <p:spPr>
-          <a:xfrm>
             <a:off x="3591190" y="2436808"/>
             <a:ext cx="676612" cy="676612"/>
           </a:xfrm>
@@ -4469,46 +4619,16 @@
       </p:cxnSp>
       <p:cxnSp>
         <p:nvCxnSpPr>
-          <p:cNvPr id="75" name="Gewinkelte Verbindung 26"/>
+          <p:cNvPr id="114" name="Straight Arrow Connector 113"/>
           <p:cNvCxnSpPr>
-            <a:endCxn id="3" idx="1"/>
+            <a:cxnSpLocks/>
           </p:cNvCxnSpPr>
           <p:nvPr/>
         </p:nvCxnSpPr>
         <p:spPr>
           <a:xfrm>
-            <a:off x="6185352" y="4149957"/>
-            <a:ext cx="774055" cy="90202"/>
-          </a:xfrm>
-          <a:prstGeom prst="bentConnector3">
-            <a:avLst>
-              <a:gd name="adj1" fmla="val 26005"/>
-            </a:avLst>
-          </a:prstGeom>
-          <a:noFill/>
-          <a:ln w="25400" cap="flat" cmpd="sng" algn="ctr">
-            <a:solidFill>
-              <a:srgbClr val="0070C0"/>
-            </a:solidFill>
-            <a:prstDash val="solid"/>
-            <a:tailEnd type="arrow"/>
-          </a:ln>
-          <a:effectLst/>
-        </p:spPr>
-      </p:cxnSp>
-      <p:cxnSp>
-        <p:nvCxnSpPr>
-          <p:cNvPr id="114" name="Straight Arrow Connector 113"/>
-          <p:cNvCxnSpPr>
-            <a:stCxn id="4" idx="2"/>
-            <a:endCxn id="14" idx="0"/>
-          </p:cNvCxnSpPr>
-          <p:nvPr/>
-        </p:nvCxnSpPr>
-        <p:spPr>
-          <a:xfrm>
-            <a:off x="9139444" y="2612009"/>
-            <a:ext cx="13319" cy="936720"/>
+            <a:off x="8902593" y="2608557"/>
+            <a:ext cx="0" cy="1003094"/>
           </a:xfrm>
           <a:prstGeom prst="straightConnector1">
             <a:avLst/>
@@ -4546,6 +4666,36 @@
           <p:nvPr/>
         </p:nvPicPr>
         <p:blipFill>
+          <a:blip r:embed="rId12" cstate="print">
+            <a:extLst>
+              <a:ext uri="{28A0092B-C50C-407E-A947-70E740481C1C}">
+                <a14:useLocalDpi xmlns:a14="http://schemas.microsoft.com/office/drawing/2010/main" val="0"/>
+              </a:ext>
+            </a:extLst>
+          </a:blip>
+          <a:stretch>
+            <a:fillRect/>
+          </a:stretch>
+        </p:blipFill>
+        <p:spPr>
+          <a:xfrm>
+            <a:off x="2235200" y="1897279"/>
+            <a:ext cx="2071543" cy="496119"/>
+          </a:xfrm>
+          <a:prstGeom prst="rect">
+            <a:avLst/>
+          </a:prstGeom>
+        </p:spPr>
+      </p:pic>
+      <p:pic>
+        <p:nvPicPr>
+          <p:cNvPr id="3" name="Picture 2"/>
+          <p:cNvPicPr>
+            <a:picLocks noChangeAspect="1"/>
+          </p:cNvPicPr>
+          <p:nvPr/>
+        </p:nvPicPr>
+        <p:blipFill>
           <a:blip r:embed="rId13" cstate="print">
             <a:extLst>
               <a:ext uri="{28A0092B-C50C-407E-A947-70E740481C1C}">
@@ -4559,44 +4709,14 @@
         </p:blipFill>
         <p:spPr>
           <a:xfrm>
-            <a:off x="2235200" y="1897279"/>
-            <a:ext cx="2071543" cy="496119"/>
+            <a:off x="6959407" y="4086557"/>
+            <a:ext cx="427854" cy="427854"/>
           </a:xfrm>
           <a:prstGeom prst="rect">
             <a:avLst/>
           </a:prstGeom>
         </p:spPr>
       </p:pic>
-      <p:pic>
-        <p:nvPicPr>
-          <p:cNvPr id="3" name="Picture 2"/>
-          <p:cNvPicPr>
-            <a:picLocks noChangeAspect="1"/>
-          </p:cNvPicPr>
-          <p:nvPr/>
-        </p:nvPicPr>
-        <p:blipFill>
-          <a:blip r:embed="rId14" cstate="print">
-            <a:extLst>
-              <a:ext uri="{28A0092B-C50C-407E-A947-70E740481C1C}">
-                <a14:useLocalDpi xmlns:a14="http://schemas.microsoft.com/office/drawing/2010/main" val="0"/>
-              </a:ext>
-            </a:extLst>
-          </a:blip>
-          <a:stretch>
-            <a:fillRect/>
-          </a:stretch>
-        </p:blipFill>
-        <p:spPr>
-          <a:xfrm>
-            <a:off x="6959407" y="4026232"/>
-            <a:ext cx="427854" cy="427854"/>
-          </a:xfrm>
-          <a:prstGeom prst="rect">
-            <a:avLst/>
-          </a:prstGeom>
-        </p:spPr>
-      </p:pic>
       <p:sp>
         <p:nvSpPr>
           <p:cNvPr id="42" name="TextBox 41"/>
@@ -4609,7 +4729,7 @@
         </p:nvSpPr>
         <p:spPr>
           <a:xfrm>
-            <a:off x="6510730" y="4474443"/>
+            <a:off x="6510730" y="4534768"/>
             <a:ext cx="1330941" cy="184666"/>
           </a:xfrm>
           <a:prstGeom prst="rect">
@@ -4668,38 +4788,6 @@
           </a:p>
         </p:txBody>
       </p:sp>
-      <p:cxnSp>
-        <p:nvCxnSpPr>
-          <p:cNvPr id="43" name="Gewinkelte Verbindung 26"/>
-          <p:cNvCxnSpPr>
-            <a:cxnSpLocks/>
-            <a:stCxn id="3" idx="3"/>
-          </p:cNvCxnSpPr>
-          <p:nvPr/>
-        </p:nvCxnSpPr>
-        <p:spPr>
-          <a:xfrm flipH="1">
-            <a:off x="6186943" y="4240159"/>
-            <a:ext cx="1200318" cy="117059"/>
-          </a:xfrm>
-          <a:prstGeom prst="bentConnector5">
-            <a:avLst>
-              <a:gd name="adj1" fmla="val -52373"/>
-              <a:gd name="adj2" fmla="val 378038"/>
-              <a:gd name="adj3" fmla="val 83562"/>
-            </a:avLst>
-          </a:prstGeom>
-          <a:noFill/>
-          <a:ln w="25400" cap="flat" cmpd="sng" algn="ctr">
-            <a:solidFill>
-              <a:srgbClr val="0070C0"/>
-            </a:solidFill>
-            <a:prstDash val="solid"/>
-            <a:tailEnd type="arrow"/>
-          </a:ln>
-          <a:effectLst/>
-        </p:spPr>
-      </p:cxnSp>
       <p:grpSp>
         <p:nvGrpSpPr>
           <p:cNvPr id="45" name="Group 44">
@@ -4716,7 +4804,7 @@
         </p:nvGrpSpPr>
         <p:grpSpPr>
           <a:xfrm>
-            <a:off x="8592746" y="4667133"/>
+            <a:off x="8431405" y="4688423"/>
             <a:ext cx="1120035" cy="358517"/>
             <a:chOff x="9739710" y="3166852"/>
             <a:chExt cx="1928150" cy="617191"/>
@@ -4737,7 +4825,7 @@
             <p:nvPr/>
           </p:nvPicPr>
           <p:blipFill>
-            <a:blip r:embed="rId15" cstate="print">
+            <a:blip r:embed="rId14" cstate="print">
               <a:extLst>
                 <a:ext uri="{28A0092B-C50C-407E-A947-70E740481C1C}">
                   <a14:useLocalDpi xmlns:a14="http://schemas.microsoft.com/office/drawing/2010/main" val="0"/>
@@ -4773,7 +4861,7 @@
             <p:nvPr/>
           </p:nvPicPr>
           <p:blipFill>
-            <a:blip r:embed="rId16" cstate="print">
+            <a:blip r:embed="rId15" cstate="print">
               <a:extLst>
                 <a:ext uri="{28A0092B-C50C-407E-A947-70E740481C1C}">
                   <a14:useLocalDpi xmlns:a14="http://schemas.microsoft.com/office/drawing/2010/main" val="0"/>
@@ -4814,14 +4902,14 @@
           </p:nvPr>
         </p:nvPicPr>
         <p:blipFill>
-          <a:blip r:embed="rId17"/>
+          <a:blip r:embed="rId16"/>
           <a:stretch>
             <a:fillRect/>
           </a:stretch>
         </p:blipFill>
         <p:spPr>
           <a:xfrm>
-            <a:off x="8592744" y="4394578"/>
+            <a:off x="8431403" y="4439688"/>
             <a:ext cx="1120037" cy="210097"/>
           </a:xfrm>
           <a:prstGeom prst="rect">
@@ -4829,42 +4917,6 @@
           </a:prstGeom>
         </p:spPr>
       </p:pic>
-      <p:cxnSp>
-        <p:nvCxnSpPr>
-          <p:cNvPr id="63" name="Gewinkelte Verbindung 26">
-            <a:extLst>
-              <a:ext uri="{FF2B5EF4-FFF2-40B4-BE49-F238E27FC236}">
-                <a16:creationId xmlns:a16="http://schemas.microsoft.com/office/drawing/2014/main" id="{ED02E10D-E5C3-4F12-BF1D-7207009FDC6B}"/>
-              </a:ext>
-            </a:extLst>
-          </p:cNvPr>
-          <p:cNvCxnSpPr>
-            <a:cxnSpLocks/>
-            <a:stCxn id="3" idx="3"/>
-          </p:cNvCxnSpPr>
-          <p:nvPr/>
-        </p:nvCxnSpPr>
-        <p:spPr>
-          <a:xfrm flipH="1">
-            <a:off x="6195918" y="4240159"/>
-            <a:ext cx="1191343" cy="622678"/>
-          </a:xfrm>
-          <a:prstGeom prst="bentConnector3">
-            <a:avLst>
-              <a:gd name="adj1" fmla="val -52635"/>
-            </a:avLst>
-          </a:prstGeom>
-          <a:noFill/>
-          <a:ln w="25400" cap="flat" cmpd="sng" algn="ctr">
-            <a:solidFill>
-              <a:srgbClr val="0070C0"/>
-            </a:solidFill>
-            <a:prstDash val="solid"/>
-            <a:tailEnd type="arrow"/>
-          </a:ln>
-          <a:effectLst/>
-        </p:spPr>
-      </p:cxnSp>
       <p:cxnSp>
         <p:nvCxnSpPr>
           <p:cNvPr id="94" name="Gewinkelte Verbindung 26">
@@ -4916,8 +4968,8 @@
         </p:nvSpPr>
         <p:spPr>
           <a:xfrm>
-            <a:off x="3931025" y="4678776"/>
-            <a:ext cx="1145489" cy="400110"/>
+            <a:off x="4267802" y="4734457"/>
+            <a:ext cx="504404" cy="307777"/>
           </a:xfrm>
           <a:prstGeom prst="rect">
             <a:avLst/>
@@ -4925,7 +4977,7 @@
           <a:noFill/>
         </p:spPr>
         <p:txBody>
-          <a:bodyPr wrap="square" rtlCol="0">
+          <a:bodyPr wrap="square" lIns="0" tIns="0" rIns="0" bIns="0" rtlCol="0">
             <a:spAutoFit/>
           </a:bodyPr>
           <a:lstStyle/>
@@ -4985,43 +5037,6 @@
           </a:p>
         </p:txBody>
       </p:sp>
-      <p:cxnSp>
-        <p:nvCxnSpPr>
-          <p:cNvPr id="158" name="Gewinkelte Verbindung 26">
-            <a:extLst>
-              <a:ext uri="{FF2B5EF4-FFF2-40B4-BE49-F238E27FC236}">
-                <a16:creationId xmlns:a16="http://schemas.microsoft.com/office/drawing/2014/main" id="{F9D5BBBD-49A2-4402-A57E-484FAF3573AC}"/>
-              </a:ext>
-            </a:extLst>
-          </p:cNvPr>
-          <p:cNvCxnSpPr>
-            <a:cxnSpLocks/>
-            <a:stCxn id="78" idx="2"/>
-            <a:endCxn id="208" idx="2"/>
-          </p:cNvCxnSpPr>
-          <p:nvPr/>
-        </p:nvCxnSpPr>
-        <p:spPr>
-          <a:xfrm rot="16200000" flipH="1">
-            <a:off x="6364172" y="2238253"/>
-            <a:ext cx="330555" cy="5244237"/>
-          </a:xfrm>
-          <a:prstGeom prst="bentConnector3">
-            <a:avLst>
-              <a:gd name="adj1" fmla="val 201186"/>
-            </a:avLst>
-          </a:prstGeom>
-          <a:noFill/>
-          <a:ln w="25400" cap="flat" cmpd="sng" algn="ctr">
-            <a:solidFill>
-              <a:srgbClr val="FF0000"/>
-            </a:solidFill>
-            <a:prstDash val="sysDot"/>
-            <a:tailEnd type="triangle"/>
-          </a:ln>
-          <a:effectLst/>
-        </p:spPr>
-      </p:cxnSp>
       <p:cxnSp>
         <p:nvCxnSpPr>
           <p:cNvPr id="167" name="Gewinkelte Verbindung 26">
@@ -5033,17 +5048,18 @@
           </p:cNvPr>
           <p:cNvCxnSpPr>
             <a:cxnSpLocks/>
+            <a:endCxn id="50" idx="1"/>
           </p:cNvCxnSpPr>
           <p:nvPr/>
         </p:nvCxnSpPr>
         <p:spPr>
           <a:xfrm>
-            <a:off x="7395199" y="4360754"/>
-            <a:ext cx="1199753" cy="177197"/>
+            <a:off x="7387261" y="4432402"/>
+            <a:ext cx="1044142" cy="112335"/>
           </a:xfrm>
           <a:prstGeom prst="bentConnector3">
             <a:avLst>
-              <a:gd name="adj1" fmla="val 66275"/>
+              <a:gd name="adj1" fmla="val 50000"/>
             </a:avLst>
           </a:prstGeom>
           <a:noFill/>
@@ -5109,41 +5125,6 @@
       </p:sp>
       <p:cxnSp>
         <p:nvCxnSpPr>
-          <p:cNvPr id="210" name="Gewinkelte Verbindung 26">
-            <a:extLst>
-              <a:ext uri="{FF2B5EF4-FFF2-40B4-BE49-F238E27FC236}">
-                <a16:creationId xmlns:a16="http://schemas.microsoft.com/office/drawing/2014/main" id="{85B99DAB-036E-49AF-BEEB-6D9F4020AE05}"/>
-              </a:ext>
-            </a:extLst>
-          </p:cNvPr>
-          <p:cNvCxnSpPr>
-            <a:cxnSpLocks/>
-          </p:cNvCxnSpPr>
-          <p:nvPr/>
-        </p:nvCxnSpPr>
-        <p:spPr>
-          <a:xfrm rot="16200000" flipH="1">
-            <a:off x="8153270" y="4006980"/>
-            <a:ext cx="743210" cy="139700"/>
-          </a:xfrm>
-          <a:prstGeom prst="bentConnector3">
-            <a:avLst>
-              <a:gd name="adj1" fmla="val 99983"/>
-            </a:avLst>
-          </a:prstGeom>
-          <a:noFill/>
-          <a:ln w="25400" cap="flat" cmpd="sng" algn="ctr">
-            <a:solidFill>
-              <a:srgbClr val="FF0000"/>
-            </a:solidFill>
-            <a:prstDash val="sysDot"/>
-            <a:tailEnd type="triangle"/>
-          </a:ln>
-          <a:effectLst/>
-        </p:spPr>
-      </p:cxnSp>
-      <p:cxnSp>
-        <p:nvCxnSpPr>
           <p:cNvPr id="229" name="Straight Connector 228">
             <a:extLst>
               <a:ext uri="{FF2B5EF4-FFF2-40B4-BE49-F238E27FC236}">
@@ -5158,8 +5139,8 @@
         </p:nvCxnSpPr>
         <p:spPr>
           <a:xfrm>
-            <a:off x="7784524" y="3717340"/>
-            <a:ext cx="807026" cy="0"/>
+            <a:off x="7780461" y="3805131"/>
+            <a:ext cx="508481" cy="4594"/>
           </a:xfrm>
           <a:prstGeom prst="line">
             <a:avLst/>
@@ -5189,40 +5170,6 @@
       </p:cxnSp>
       <p:cxnSp>
         <p:nvCxnSpPr>
-          <p:cNvPr id="242" name="Gewinkelte Verbindung 26">
-            <a:extLst>
-              <a:ext uri="{FF2B5EF4-FFF2-40B4-BE49-F238E27FC236}">
-                <a16:creationId xmlns:a16="http://schemas.microsoft.com/office/drawing/2014/main" id="{4B3FDA34-03DC-4E3E-8C02-E34D837E5546}"/>
-              </a:ext>
-            </a:extLst>
-          </p:cNvPr>
-          <p:cNvCxnSpPr>
-            <a:cxnSpLocks/>
-            <a:endCxn id="208" idx="1"/>
-          </p:cNvCxnSpPr>
-          <p:nvPr/>
-        </p:nvCxnSpPr>
-        <p:spPr>
-          <a:xfrm rot="16200000" flipH="1">
-            <a:off x="8338291" y="4573015"/>
-            <a:ext cx="365722" cy="140795"/>
-          </a:xfrm>
-          <a:prstGeom prst="bentConnector2">
-            <a:avLst/>
-          </a:prstGeom>
-          <a:noFill/>
-          <a:ln w="25400" cap="flat" cmpd="sng" algn="ctr">
-            <a:solidFill>
-              <a:srgbClr val="FF0000"/>
-            </a:solidFill>
-            <a:prstDash val="sysDot"/>
-            <a:tailEnd type="triangle"/>
-          </a:ln>
-          <a:effectLst/>
-        </p:spPr>
-      </p:cxnSp>
-      <p:cxnSp>
-        <p:nvCxnSpPr>
           <p:cNvPr id="118" name="Gewinkelte Verbindung 26">
             <a:extLst>
               <a:ext uri="{FF2B5EF4-FFF2-40B4-BE49-F238E27FC236}">
@@ -5237,12 +5184,12 @@
         </p:nvCxnSpPr>
         <p:spPr>
           <a:xfrm rot="10800000" flipV="1">
-            <a:off x="6197156" y="3898070"/>
-            <a:ext cx="1808823" cy="964766"/>
+            <a:off x="6197158" y="3975100"/>
+            <a:ext cx="1810193" cy="887736"/>
           </a:xfrm>
           <a:prstGeom prst="bentConnector3">
             <a:avLst>
-              <a:gd name="adj1" fmla="val -464"/>
+              <a:gd name="adj1" fmla="val -339"/>
             </a:avLst>
           </a:prstGeom>
           <a:noFill/>
@@ -5256,36 +5203,6 @@
           <a:effectLst/>
         </p:spPr>
       </p:cxnSp>
-      <p:cxnSp>
-        <p:nvCxnSpPr>
-          <p:cNvPr id="41" name="Gewinkelte Verbindung 26"/>
-          <p:cNvCxnSpPr>
-            <a:cxnSpLocks/>
-            <a:stCxn id="2" idx="3"/>
-          </p:cNvCxnSpPr>
-          <p:nvPr/>
-        </p:nvCxnSpPr>
-        <p:spPr>
-          <a:xfrm flipH="1">
-            <a:off x="6185352" y="3649949"/>
-            <a:ext cx="1599172" cy="248120"/>
-          </a:xfrm>
-          <a:prstGeom prst="bentConnector3">
-            <a:avLst>
-              <a:gd name="adj1" fmla="val -14295"/>
-            </a:avLst>
-          </a:prstGeom>
-          <a:noFill/>
-          <a:ln w="25400" cap="flat" cmpd="sng" algn="ctr">
-            <a:solidFill>
-              <a:srgbClr val="0070C0"/>
-            </a:solidFill>
-            <a:prstDash val="solid"/>
-            <a:tailEnd type="arrow"/>
-          </a:ln>
-          <a:effectLst/>
-        </p:spPr>
-      </p:cxnSp>
       <p:sp>
         <p:nvSpPr>
           <p:cNvPr id="250" name="TextBox 249">
@@ -5300,8 +5217,8 @@
         </p:nvSpPr>
         <p:spPr>
           <a:xfrm>
-            <a:off x="7887725" y="4988798"/>
-            <a:ext cx="1145489" cy="400110"/>
+            <a:off x="8867085" y="3307057"/>
+            <a:ext cx="768068" cy="307777"/>
           </a:xfrm>
           <a:prstGeom prst="rect">
             <a:avLst/>
@@ -5309,12 +5226,12 @@
           <a:noFill/>
         </p:spPr>
         <p:txBody>
-          <a:bodyPr wrap="square" rtlCol="0">
+          <a:bodyPr wrap="square" lIns="0" tIns="0" rIns="0" bIns="0" rtlCol="0">
             <a:spAutoFit/>
           </a:bodyPr>
           <a:lstStyle/>
           <a:p>
-            <a:pPr algn="ctr" eaLnBrk="0" fontAlgn="base" hangingPunct="0">
+            <a:pPr algn="r" eaLnBrk="0" fontAlgn="base" hangingPunct="0">
               <a:spcBef>
                 <a:spcPct val="0"/>
               </a:spcBef>
@@ -5330,7 +5247,27 @@
                 <a:latin typeface="Arial" charset="0"/>
                 <a:cs typeface="Arial" charset="0"/>
               </a:rPr>
-              <a:t>system integration</a:t>
+              <a:t>system</a:t>
+            </a:r>
+          </a:p>
+          <a:p>
+            <a:pPr algn="r" eaLnBrk="0" fontAlgn="base" hangingPunct="0">
+              <a:spcBef>
+                <a:spcPct val="0"/>
+              </a:spcBef>
+              <a:spcAft>
+                <a:spcPct val="0"/>
+              </a:spcAft>
+            </a:pPr>
+            <a:r>
+              <a:rPr lang="sv-SE" sz="1000" b="1" dirty="0">
+                <a:solidFill>
+                  <a:srgbClr val="FF0000"/>
+                </a:solidFill>
+                <a:latin typeface="Arial" charset="0"/>
+                <a:cs typeface="Arial" charset="0"/>
+              </a:rPr>
+              <a:t>integration</a:t>
             </a:r>
             <a:endParaRPr lang="en-US" sz="1000" b="1" dirty="0">
               <a:solidFill>
@@ -5359,13 +5296,13 @@
         </p:nvCxnSpPr>
         <p:spPr>
           <a:xfrm rot="5400000" flipH="1" flipV="1">
-            <a:off x="3069756" y="4016937"/>
-            <a:ext cx="176128" cy="856692"/>
+            <a:off x="3149928" y="3968196"/>
+            <a:ext cx="27604" cy="848192"/>
           </a:xfrm>
           <a:prstGeom prst="bentConnector4">
             <a:avLst>
-              <a:gd name="adj1" fmla="val -105275"/>
-              <a:gd name="adj2" fmla="val 78618"/>
+              <a:gd name="adj1" fmla="val -615356"/>
+              <a:gd name="adj2" fmla="val 78403"/>
             </a:avLst>
           </a:prstGeom>
           <a:ln w="25400">
@@ -5406,8 +5343,8 @@
         </p:nvSpPr>
         <p:spPr>
           <a:xfrm>
-            <a:off x="2541714" y="4678776"/>
-            <a:ext cx="1145489" cy="400110"/>
+            <a:off x="2732459" y="4580568"/>
+            <a:ext cx="671795" cy="307777"/>
           </a:xfrm>
           <a:prstGeom prst="rect">
             <a:avLst/>
@@ -5415,7 +5352,7 @@
           <a:noFill/>
         </p:spPr>
         <p:txBody>
-          <a:bodyPr wrap="square" rtlCol="0">
+          <a:bodyPr wrap="square" lIns="0" tIns="0" rIns="0" bIns="0" rtlCol="0">
             <a:spAutoFit/>
           </a:bodyPr>
           <a:lstStyle/>
@@ -5475,6 +5412,217 @@
           </a:p>
         </p:txBody>
       </p:sp>
+      <p:cxnSp>
+        <p:nvCxnSpPr>
+          <p:cNvPr id="19" name="Straight Arrow Connector 18">
+            <a:extLst>
+              <a:ext uri="{FF2B5EF4-FFF2-40B4-BE49-F238E27FC236}">
+                <a16:creationId xmlns:a16="http://schemas.microsoft.com/office/drawing/2014/main" id="{3FFD129D-EB3A-4897-BF4E-11FE66000953}"/>
+              </a:ext>
+            </a:extLst>
+          </p:cNvPr>
+          <p:cNvCxnSpPr>
+            <a:cxnSpLocks/>
+            <a:endCxn id="3" idx="1"/>
+          </p:cNvCxnSpPr>
+          <p:nvPr/>
+        </p:nvCxnSpPr>
+        <p:spPr>
+          <a:xfrm>
+            <a:off x="6195918" y="4300484"/>
+            <a:ext cx="763489" cy="0"/>
+          </a:xfrm>
+          <a:prstGeom prst="straightConnector1">
+            <a:avLst/>
+          </a:prstGeom>
+          <a:ln w="25400">
+            <a:solidFill>
+              <a:srgbClr val="0070C0"/>
+            </a:solidFill>
+            <a:headEnd type="none"/>
+            <a:tailEnd type="arrow"/>
+          </a:ln>
+        </p:spPr>
+        <p:style>
+          <a:lnRef idx="1">
+            <a:schemeClr val="accent1"/>
+          </a:lnRef>
+          <a:fillRef idx="0">
+            <a:schemeClr val="accent1"/>
+          </a:fillRef>
+          <a:effectRef idx="0">
+            <a:schemeClr val="accent1"/>
+          </a:effectRef>
+          <a:fontRef idx="minor">
+            <a:schemeClr val="tx1"/>
+          </a:fontRef>
+        </p:style>
+      </p:cxnSp>
+      <p:cxnSp>
+        <p:nvCxnSpPr>
+          <p:cNvPr id="64" name="Straight Arrow Connector 63">
+            <a:extLst>
+              <a:ext uri="{FF2B5EF4-FFF2-40B4-BE49-F238E27FC236}">
+                <a16:creationId xmlns:a16="http://schemas.microsoft.com/office/drawing/2014/main" id="{D881394D-3953-45AE-91DC-96665382F0ED}"/>
+              </a:ext>
+            </a:extLst>
+          </p:cNvPr>
+          <p:cNvCxnSpPr>
+            <a:cxnSpLocks/>
+            <a:stCxn id="3" idx="3"/>
+          </p:cNvCxnSpPr>
+          <p:nvPr/>
+        </p:nvCxnSpPr>
+        <p:spPr>
+          <a:xfrm>
+            <a:off x="7387261" y="4300484"/>
+            <a:ext cx="620090" cy="0"/>
+          </a:xfrm>
+          <a:prstGeom prst="straightConnector1">
+            <a:avLst/>
+          </a:prstGeom>
+          <a:ln w="25400">
+            <a:solidFill>
+              <a:srgbClr val="0070C0"/>
+            </a:solidFill>
+            <a:headEnd type="none"/>
+            <a:tailEnd type="none"/>
+          </a:ln>
+        </p:spPr>
+        <p:style>
+          <a:lnRef idx="1">
+            <a:schemeClr val="accent1"/>
+          </a:lnRef>
+          <a:fillRef idx="0">
+            <a:schemeClr val="accent1"/>
+          </a:fillRef>
+          <a:effectRef idx="0">
+            <a:schemeClr val="accent1"/>
+          </a:effectRef>
+          <a:fontRef idx="minor">
+            <a:schemeClr val="tx1"/>
+          </a:fontRef>
+        </p:style>
+      </p:cxnSp>
+      <p:cxnSp>
+        <p:nvCxnSpPr>
+          <p:cNvPr id="85" name="Straight Arrow Connector 84">
+            <a:extLst>
+              <a:ext uri="{FF2B5EF4-FFF2-40B4-BE49-F238E27FC236}">
+                <a16:creationId xmlns:a16="http://schemas.microsoft.com/office/drawing/2014/main" id="{B16F0F9E-613D-49A5-8B86-B44ADF50A8B4}"/>
+              </a:ext>
+            </a:extLst>
+          </p:cNvPr>
+          <p:cNvCxnSpPr>
+            <a:cxnSpLocks/>
+            <a:stCxn id="2" idx="3"/>
+          </p:cNvCxnSpPr>
+          <p:nvPr/>
+        </p:nvCxnSpPr>
+        <p:spPr>
+          <a:xfrm flipV="1">
+            <a:off x="7784524" y="3719798"/>
+            <a:ext cx="224066" cy="1"/>
+          </a:xfrm>
+          <a:prstGeom prst="straightConnector1">
+            <a:avLst/>
+          </a:prstGeom>
+          <a:ln w="25400">
+            <a:solidFill>
+              <a:srgbClr val="0070C0"/>
+            </a:solidFill>
+            <a:headEnd type="none"/>
+            <a:tailEnd type="none"/>
+          </a:ln>
+        </p:spPr>
+        <p:style>
+          <a:lnRef idx="1">
+            <a:schemeClr val="accent1"/>
+          </a:lnRef>
+          <a:fillRef idx="0">
+            <a:schemeClr val="accent1"/>
+          </a:fillRef>
+          <a:effectRef idx="0">
+            <a:schemeClr val="accent1"/>
+          </a:effectRef>
+          <a:fontRef idx="minor">
+            <a:schemeClr val="tx1"/>
+          </a:fontRef>
+        </p:style>
+      </p:cxnSp>
+      <p:cxnSp>
+        <p:nvCxnSpPr>
+          <p:cNvPr id="158" name="Gewinkelte Verbindung 26">
+            <a:extLst>
+              <a:ext uri="{FF2B5EF4-FFF2-40B4-BE49-F238E27FC236}">
+                <a16:creationId xmlns:a16="http://schemas.microsoft.com/office/drawing/2014/main" id="{F9D5BBBD-49A2-4402-A57E-484FAF3573AC}"/>
+              </a:ext>
+            </a:extLst>
+          </p:cNvPr>
+          <p:cNvCxnSpPr>
+            <a:cxnSpLocks/>
+            <a:stCxn id="78" idx="2"/>
+            <a:endCxn id="46" idx="2"/>
+          </p:cNvCxnSpPr>
+          <p:nvPr/>
+        </p:nvCxnSpPr>
+        <p:spPr>
+          <a:xfrm rot="16200000" flipH="1">
+            <a:off x="6327031" y="2275394"/>
+            <a:ext cx="351845" cy="5191245"/>
+          </a:xfrm>
+          <a:prstGeom prst="bentConnector3">
+            <a:avLst>
+              <a:gd name="adj1" fmla="val 164972"/>
+            </a:avLst>
+          </a:prstGeom>
+          <a:noFill/>
+          <a:ln w="25400" cap="flat" cmpd="sng" algn="ctr">
+            <a:solidFill>
+              <a:srgbClr val="FF0000"/>
+            </a:solidFill>
+            <a:prstDash val="sysDot"/>
+            <a:tailEnd type="triangle"/>
+          </a:ln>
+          <a:effectLst/>
+        </p:spPr>
+      </p:cxnSp>
+      <p:pic>
+        <p:nvPicPr>
+          <p:cNvPr id="113" name="Picture 112">
+            <a:extLst>
+              <a:ext uri="{FF2B5EF4-FFF2-40B4-BE49-F238E27FC236}">
+                <a16:creationId xmlns:a16="http://schemas.microsoft.com/office/drawing/2014/main" id="{BB6DEBAC-57D1-40BD-80ED-EB16B14885CC}"/>
+              </a:ext>
+            </a:extLst>
+          </p:cNvPr>
+          <p:cNvPicPr>
+            <a:picLocks noChangeAspect="1"/>
+          </p:cNvPicPr>
+          <p:nvPr/>
+        </p:nvPicPr>
+        <p:blipFill>
+          <a:blip r:embed="rId17">
+            <a:extLst>
+              <a:ext uri="{28A0092B-C50C-407E-A947-70E740481C1C}">
+                <a14:useLocalDpi xmlns:a14="http://schemas.microsoft.com/office/drawing/2010/main" val="0"/>
+              </a:ext>
+            </a:extLst>
+          </a:blip>
+          <a:stretch>
+            <a:fillRect/>
+          </a:stretch>
+        </p:blipFill>
+        <p:spPr>
+          <a:xfrm>
+            <a:off x="2236083" y="3112318"/>
+            <a:ext cx="980952" cy="980952"/>
+          </a:xfrm>
+          <a:prstGeom prst="rect">
+            <a:avLst/>
+          </a:prstGeom>
+        </p:spPr>
+      </p:pic>
     </p:spTree>
     <p:extLst>
       <p:ext uri="{BB962C8B-B14F-4D97-AF65-F5344CB8AC3E}">

</xml_diff>